<commit_message>
Kylie Push Presentation Fixed Effort Estimate page
</commit_message>
<xml_diff>
--- a/Presentation1.pptx
+++ b/Presentation1.pptx
@@ -128,10 +128,10 @@
   </p:defaultTextStyle>
   <p:extLst>
     <p:ext uri="{EFAFB233-063F-42B5-8137-9DF3F51BA10A}">
-      <p15:sldGuideLst xmlns="" xmlns:p15="http://schemas.microsoft.com/office/powerpoint/2012/main"/>
+      <p15:sldGuideLst xmlns:p15="http://schemas.microsoft.com/office/powerpoint/2012/main" xmlns=""/>
     </p:ext>
     <p:ext uri="{2D200454-40CA-4A62-9FC3-DE9A4176ACB9}">
-      <p15:notesGuideLst xmlns="" xmlns:p15="http://schemas.microsoft.com/office/powerpoint/2012/main"/>
+      <p15:notesGuideLst xmlns:p15="http://schemas.microsoft.com/office/powerpoint/2012/main" xmlns=""/>
     </p:ext>
   </p:extLst>
 </p:presentation>
@@ -219,7 +219,7 @@
           <a:p>
             <a:fld id="{65700FC0-9E7A-4C53-8A3B-3C3C9A736C42}" type="datetimeFigureOut">
               <a:rPr lang="en-US" smtClean="0"/>
-              <a:t>4/3/17</a:t>
+              <a:t>4/4/17</a:t>
             </a:fld>
             <a:endParaRPr lang="en-US"/>
           </a:p>
@@ -384,7 +384,7 @@
           <a:p>
             <a:fld id="{8AF122B6-E47E-4A80-A9F3-23FD10D674FE}" type="datetimeFigureOut">
               <a:rPr lang="en-US" smtClean="0"/>
-              <a:t>4/3/17</a:t>
+              <a:t>4/4/17</a:t>
             </a:fld>
             <a:endParaRPr lang="en-US"/>
           </a:p>
@@ -695,7 +695,7 @@
             <a:fld id="{349BF3EA-1A78-4F07-BDC0-C8A1BD461199}" type="datetimeFigureOut">
               <a:rPr lang="en-US" smtClean="0"/>
               <a:pPr/>
-              <a:t>4/3/17</a:t>
+              <a:t>4/4/17</a:t>
             </a:fld>
             <a:endParaRPr lang="en-US"/>
           </a:p>
@@ -1056,7 +1056,7 @@
           <a:p>
             <a:fld id="{349BF3EA-1A78-4F07-BDC0-C8A1BD461199}" type="datetimeFigureOut">
               <a:rPr lang="en-US" smtClean="0"/>
-              <a:t>4/3/17</a:t>
+              <a:t>4/4/17</a:t>
             </a:fld>
             <a:endParaRPr lang="en-US"/>
           </a:p>
@@ -1254,7 +1254,7 @@
           <a:p>
             <a:fld id="{349BF3EA-1A78-4F07-BDC0-C8A1BD461199}" type="datetimeFigureOut">
               <a:rPr lang="en-US" smtClean="0"/>
-              <a:t>4/3/17</a:t>
+              <a:t>4/4/17</a:t>
             </a:fld>
             <a:endParaRPr lang="en-US"/>
           </a:p>
@@ -1502,7 +1502,7 @@
           <a:p>
             <a:fld id="{349BF3EA-1A78-4F07-BDC0-C8A1BD461199}" type="datetimeFigureOut">
               <a:rPr lang="en-US" smtClean="0"/>
-              <a:t>4/3/17</a:t>
+              <a:t>4/4/17</a:t>
             </a:fld>
             <a:endParaRPr lang="en-US"/>
           </a:p>
@@ -1773,7 +1773,7 @@
           <a:p>
             <a:fld id="{349BF3EA-1A78-4F07-BDC0-C8A1BD461199}" type="datetimeFigureOut">
               <a:rPr lang="en-US" smtClean="0"/>
-              <a:t>4/3/17</a:t>
+              <a:t>4/4/17</a:t>
             </a:fld>
             <a:endParaRPr lang="en-US"/>
           </a:p>
@@ -2144,7 +2144,7 @@
           <a:p>
             <a:fld id="{349BF3EA-1A78-4F07-BDC0-C8A1BD461199}" type="datetimeFigureOut">
               <a:rPr lang="en-US" smtClean="0"/>
-              <a:t>4/3/17</a:t>
+              <a:t>4/4/17</a:t>
             </a:fld>
             <a:endParaRPr lang="en-US"/>
           </a:p>
@@ -2475,7 +2475,7 @@
           <a:p>
             <a:fld id="{349BF3EA-1A78-4F07-BDC0-C8A1BD461199}" type="datetimeFigureOut">
               <a:rPr lang="en-US" smtClean="0"/>
-              <a:t>4/3/17</a:t>
+              <a:t>4/4/17</a:t>
             </a:fld>
             <a:endParaRPr lang="en-US"/>
           </a:p>
@@ -2730,7 +2730,7 @@
           <a:p>
             <a:fld id="{349BF3EA-1A78-4F07-BDC0-C8A1BD461199}" type="datetimeFigureOut">
               <a:rPr lang="en-US" smtClean="0"/>
-              <a:t>4/3/17</a:t>
+              <a:t>4/4/17</a:t>
             </a:fld>
             <a:endParaRPr lang="en-US"/>
           </a:p>
@@ -2837,7 +2837,7 @@
           <a:p>
             <a:fld id="{349BF3EA-1A78-4F07-BDC0-C8A1BD461199}" type="datetimeFigureOut">
               <a:rPr lang="en-US" smtClean="0"/>
-              <a:t>4/3/17</a:t>
+              <a:t>4/4/17</a:t>
             </a:fld>
             <a:endParaRPr lang="en-US"/>
           </a:p>
@@ -3136,7 +3136,7 @@
           <a:p>
             <a:fld id="{349BF3EA-1A78-4F07-BDC0-C8A1BD461199}" type="datetimeFigureOut">
               <a:rPr lang="en-US" smtClean="0"/>
-              <a:t>4/3/17</a:t>
+              <a:t>4/4/17</a:t>
             </a:fld>
             <a:endParaRPr lang="en-US"/>
           </a:p>
@@ -3424,7 +3424,7 @@
           <a:p>
             <a:fld id="{349BF3EA-1A78-4F07-BDC0-C8A1BD461199}" type="datetimeFigureOut">
               <a:rPr lang="en-US" smtClean="0"/>
-              <a:t>4/3/17</a:t>
+              <a:t>4/4/17</a:t>
             </a:fld>
             <a:endParaRPr lang="en-US"/>
           </a:p>
@@ -3554,7 +3554,7 @@
             <a:fld id="{349BF3EA-1A78-4F07-BDC0-C8A1BD461199}" type="datetimeFigureOut">
               <a:rPr lang="en-US" smtClean="0"/>
               <a:pPr/>
-              <a:t>4/3/17</a:t>
+              <a:t>4/4/17</a:t>
             </a:fld>
             <a:endParaRPr lang="en-US"/>
           </a:p>
@@ -4311,7 +4311,6 @@
               <a:rPr lang="en-US" dirty="0"/>
               <a:t>Effort Estimate Assumptions</a:t>
             </a:r>
-            <a:endParaRPr lang="en-US" dirty="0"/>
           </a:p>
         </p:txBody>
       </p:sp>
@@ -4344,28 +4343,28 @@
                 <a:gridCol w="2743200">
                   <a:extLst>
                     <a:ext uri="{9D8B030D-6E8A-4147-A177-3AD203B41FA5}">
-                      <a16:colId xmlns="" xmlns:a16="http://schemas.microsoft.com/office/drawing/2014/main" val="4007007747"/>
+                      <a16:colId xmlns:a16="http://schemas.microsoft.com/office/drawing/2014/main" xmlns="" val="4007007747"/>
                     </a:ext>
                   </a:extLst>
                 </a:gridCol>
                 <a:gridCol w="2743200">
                   <a:extLst>
                     <a:ext uri="{9D8B030D-6E8A-4147-A177-3AD203B41FA5}">
-                      <a16:colId xmlns="" xmlns:a16="http://schemas.microsoft.com/office/drawing/2014/main" val="2089765381"/>
+                      <a16:colId xmlns:a16="http://schemas.microsoft.com/office/drawing/2014/main" xmlns="" val="2089765381"/>
                     </a:ext>
                   </a:extLst>
                 </a:gridCol>
                 <a:gridCol w="2743200">
                   <a:extLst>
                     <a:ext uri="{9D8B030D-6E8A-4147-A177-3AD203B41FA5}">
-                      <a16:colId xmlns="" xmlns:a16="http://schemas.microsoft.com/office/drawing/2014/main" val="2946535250"/>
+                      <a16:colId xmlns:a16="http://schemas.microsoft.com/office/drawing/2014/main" xmlns="" val="2946535250"/>
                     </a:ext>
                   </a:extLst>
                 </a:gridCol>
                 <a:gridCol w="2743200">
                   <a:extLst>
                     <a:ext uri="{9D8B030D-6E8A-4147-A177-3AD203B41FA5}">
-                      <a16:colId xmlns="" xmlns:a16="http://schemas.microsoft.com/office/drawing/2014/main" val="2232881725"/>
+                      <a16:colId xmlns:a16="http://schemas.microsoft.com/office/drawing/2014/main" xmlns="" val="2232881725"/>
                     </a:ext>
                   </a:extLst>
                 </a:gridCol>
@@ -4429,7 +4428,7 @@
                 </a:tc>
                 <a:extLst>
                   <a:ext uri="{0D108BD9-81ED-4DB2-BD59-A6C34878D82A}">
-                    <a16:rowId xmlns="" xmlns:a16="http://schemas.microsoft.com/office/drawing/2014/main" val="2585052838"/>
+                    <a16:rowId xmlns:a16="http://schemas.microsoft.com/office/drawing/2014/main" xmlns="" val="2585052838"/>
                   </a:ext>
                 </a:extLst>
               </a:tr>
@@ -4496,7 +4495,7 @@
                 </a:tc>
                 <a:extLst>
                   <a:ext uri="{0D108BD9-81ED-4DB2-BD59-A6C34878D82A}">
-                    <a16:rowId xmlns="" xmlns:a16="http://schemas.microsoft.com/office/drawing/2014/main" val="2440870835"/>
+                    <a16:rowId xmlns:a16="http://schemas.microsoft.com/office/drawing/2014/main" xmlns="" val="2440870835"/>
                   </a:ext>
                 </a:extLst>
               </a:tr>
@@ -4557,7 +4556,7 @@
                 </a:tc>
                 <a:extLst>
                   <a:ext uri="{0D108BD9-81ED-4DB2-BD59-A6C34878D82A}">
-                    <a16:rowId xmlns="" xmlns:a16="http://schemas.microsoft.com/office/drawing/2014/main" val="3880781591"/>
+                    <a16:rowId xmlns:a16="http://schemas.microsoft.com/office/drawing/2014/main" xmlns="" val="3880781591"/>
                   </a:ext>
                 </a:extLst>
               </a:tr>
@@ -4624,7 +4623,7 @@
                 </a:tc>
                 <a:extLst>
                   <a:ext uri="{0D108BD9-81ED-4DB2-BD59-A6C34878D82A}">
-                    <a16:rowId xmlns="" xmlns:a16="http://schemas.microsoft.com/office/drawing/2014/main" val="4195087847"/>
+                    <a16:rowId xmlns:a16="http://schemas.microsoft.com/office/drawing/2014/main" xmlns="" val="4195087847"/>
                   </a:ext>
                 </a:extLst>
               </a:tr>
@@ -4790,7 +4789,6 @@
               <a:rPr lang="en-US" dirty="0"/>
               <a:t>Effort Estimate Assumptions</a:t>
             </a:r>
-            <a:endParaRPr lang="en-US" dirty="0"/>
           </a:p>
         </p:txBody>
       </p:sp>
@@ -4823,28 +4821,28 @@
                 <a:gridCol w="2743200">
                   <a:extLst>
                     <a:ext uri="{9D8B030D-6E8A-4147-A177-3AD203B41FA5}">
-                      <a16:colId xmlns="" xmlns:a16="http://schemas.microsoft.com/office/drawing/2014/main" val="4007007747"/>
+                      <a16:colId xmlns:a16="http://schemas.microsoft.com/office/drawing/2014/main" xmlns="" val="4007007747"/>
                     </a:ext>
                   </a:extLst>
                 </a:gridCol>
                 <a:gridCol w="2743200">
                   <a:extLst>
                     <a:ext uri="{9D8B030D-6E8A-4147-A177-3AD203B41FA5}">
-                      <a16:colId xmlns="" xmlns:a16="http://schemas.microsoft.com/office/drawing/2014/main" val="2089765381"/>
+                      <a16:colId xmlns:a16="http://schemas.microsoft.com/office/drawing/2014/main" xmlns="" val="2089765381"/>
                     </a:ext>
                   </a:extLst>
                 </a:gridCol>
                 <a:gridCol w="2743200">
                   <a:extLst>
                     <a:ext uri="{9D8B030D-6E8A-4147-A177-3AD203B41FA5}">
-                      <a16:colId xmlns="" xmlns:a16="http://schemas.microsoft.com/office/drawing/2014/main" val="2946535250"/>
+                      <a16:colId xmlns:a16="http://schemas.microsoft.com/office/drawing/2014/main" xmlns="" val="2946535250"/>
                     </a:ext>
                   </a:extLst>
                 </a:gridCol>
                 <a:gridCol w="2743200">
                   <a:extLst>
                     <a:ext uri="{9D8B030D-6E8A-4147-A177-3AD203B41FA5}">
-                      <a16:colId xmlns="" xmlns:a16="http://schemas.microsoft.com/office/drawing/2014/main" val="2232881725"/>
+                      <a16:colId xmlns:a16="http://schemas.microsoft.com/office/drawing/2014/main" xmlns="" val="2232881725"/>
                     </a:ext>
                   </a:extLst>
                 </a:gridCol>
@@ -4908,7 +4906,7 @@
                 </a:tc>
                 <a:extLst>
                   <a:ext uri="{0D108BD9-81ED-4DB2-BD59-A6C34878D82A}">
-                    <a16:rowId xmlns="" xmlns:a16="http://schemas.microsoft.com/office/drawing/2014/main" val="2585052838"/>
+                    <a16:rowId xmlns:a16="http://schemas.microsoft.com/office/drawing/2014/main" xmlns="" val="2585052838"/>
                   </a:ext>
                 </a:extLst>
               </a:tr>
@@ -4975,7 +4973,7 @@
                 </a:tc>
                 <a:extLst>
                   <a:ext uri="{0D108BD9-81ED-4DB2-BD59-A6C34878D82A}">
-                    <a16:rowId xmlns="" xmlns:a16="http://schemas.microsoft.com/office/drawing/2014/main" val="2319653860"/>
+                    <a16:rowId xmlns:a16="http://schemas.microsoft.com/office/drawing/2014/main" xmlns="" val="2319653860"/>
                   </a:ext>
                 </a:extLst>
               </a:tr>
@@ -5036,7 +5034,7 @@
                 </a:tc>
                 <a:extLst>
                   <a:ext uri="{0D108BD9-81ED-4DB2-BD59-A6C34878D82A}">
-                    <a16:rowId xmlns="" xmlns:a16="http://schemas.microsoft.com/office/drawing/2014/main" val="2490656911"/>
+                    <a16:rowId xmlns:a16="http://schemas.microsoft.com/office/drawing/2014/main" xmlns="" val="2490656911"/>
                   </a:ext>
                 </a:extLst>
               </a:tr>
@@ -5103,7 +5101,7 @@
                 </a:tc>
                 <a:extLst>
                   <a:ext uri="{0D108BD9-81ED-4DB2-BD59-A6C34878D82A}">
-                    <a16:rowId xmlns="" xmlns:a16="http://schemas.microsoft.com/office/drawing/2014/main" val="281916472"/>
+                    <a16:rowId xmlns:a16="http://schemas.microsoft.com/office/drawing/2014/main" xmlns="" val="281916472"/>
                   </a:ext>
                 </a:extLst>
               </a:tr>
@@ -5269,7 +5267,6 @@
               <a:rPr lang="en-US" dirty="0"/>
               <a:t>Effort Estimate Assumptions</a:t>
             </a:r>
-            <a:endParaRPr lang="en-US" dirty="0"/>
           </a:p>
         </p:txBody>
       </p:sp>
@@ -5302,28 +5299,28 @@
                 <a:gridCol w="2743200">
                   <a:extLst>
                     <a:ext uri="{9D8B030D-6E8A-4147-A177-3AD203B41FA5}">
-                      <a16:colId xmlns="" xmlns:a16="http://schemas.microsoft.com/office/drawing/2014/main" val="4007007747"/>
+                      <a16:colId xmlns:a16="http://schemas.microsoft.com/office/drawing/2014/main" xmlns="" val="4007007747"/>
                     </a:ext>
                   </a:extLst>
                 </a:gridCol>
                 <a:gridCol w="2743200">
                   <a:extLst>
                     <a:ext uri="{9D8B030D-6E8A-4147-A177-3AD203B41FA5}">
-                      <a16:colId xmlns="" xmlns:a16="http://schemas.microsoft.com/office/drawing/2014/main" val="2089765381"/>
+                      <a16:colId xmlns:a16="http://schemas.microsoft.com/office/drawing/2014/main" xmlns="" val="2089765381"/>
                     </a:ext>
                   </a:extLst>
                 </a:gridCol>
                 <a:gridCol w="2743200">
                   <a:extLst>
                     <a:ext uri="{9D8B030D-6E8A-4147-A177-3AD203B41FA5}">
-                      <a16:colId xmlns="" xmlns:a16="http://schemas.microsoft.com/office/drawing/2014/main" val="2946535250"/>
+                      <a16:colId xmlns:a16="http://schemas.microsoft.com/office/drawing/2014/main" xmlns="" val="2946535250"/>
                     </a:ext>
                   </a:extLst>
                 </a:gridCol>
                 <a:gridCol w="2743200">
                   <a:extLst>
                     <a:ext uri="{9D8B030D-6E8A-4147-A177-3AD203B41FA5}">
-                      <a16:colId xmlns="" xmlns:a16="http://schemas.microsoft.com/office/drawing/2014/main" val="2232881725"/>
+                      <a16:colId xmlns:a16="http://schemas.microsoft.com/office/drawing/2014/main" xmlns="" val="2232881725"/>
                     </a:ext>
                   </a:extLst>
                 </a:gridCol>
@@ -5387,7 +5384,7 @@
                 </a:tc>
                 <a:extLst>
                   <a:ext uri="{0D108BD9-81ED-4DB2-BD59-A6C34878D82A}">
-                    <a16:rowId xmlns="" xmlns:a16="http://schemas.microsoft.com/office/drawing/2014/main" val="2585052838"/>
+                    <a16:rowId xmlns:a16="http://schemas.microsoft.com/office/drawing/2014/main" xmlns="" val="2585052838"/>
                   </a:ext>
                 </a:extLst>
               </a:tr>
@@ -5454,7 +5451,7 @@
                 </a:tc>
                 <a:extLst>
                   <a:ext uri="{0D108BD9-81ED-4DB2-BD59-A6C34878D82A}">
-                    <a16:rowId xmlns="" xmlns:a16="http://schemas.microsoft.com/office/drawing/2014/main" val="3764811118"/>
+                    <a16:rowId xmlns:a16="http://schemas.microsoft.com/office/drawing/2014/main" xmlns="" val="3764811118"/>
                   </a:ext>
                 </a:extLst>
               </a:tr>
@@ -5521,7 +5518,7 @@
                 </a:tc>
                 <a:extLst>
                   <a:ext uri="{0D108BD9-81ED-4DB2-BD59-A6C34878D82A}">
-                    <a16:rowId xmlns="" xmlns:a16="http://schemas.microsoft.com/office/drawing/2014/main" val="14760046"/>
+                    <a16:rowId xmlns:a16="http://schemas.microsoft.com/office/drawing/2014/main" xmlns="" val="14760046"/>
                   </a:ext>
                 </a:extLst>
               </a:tr>
@@ -5588,7 +5585,7 @@
                 </a:tc>
                 <a:extLst>
                   <a:ext uri="{0D108BD9-81ED-4DB2-BD59-A6C34878D82A}">
-                    <a16:rowId xmlns="" xmlns:a16="http://schemas.microsoft.com/office/drawing/2014/main" val="1188642816"/>
+                    <a16:rowId xmlns:a16="http://schemas.microsoft.com/office/drawing/2014/main" xmlns="" val="1188642816"/>
                   </a:ext>
                 </a:extLst>
               </a:tr>
@@ -5652,7 +5649,7 @@
                 </a:tc>
                 <a:extLst>
                   <a:ext uri="{0D108BD9-81ED-4DB2-BD59-A6C34878D82A}">
-                    <a16:rowId xmlns="" xmlns:a16="http://schemas.microsoft.com/office/drawing/2014/main" val="297767302"/>
+                    <a16:rowId xmlns:a16="http://schemas.microsoft.com/office/drawing/2014/main" xmlns="" val="297767302"/>
                   </a:ext>
                 </a:extLst>
               </a:tr>
@@ -5818,7 +5815,6 @@
               <a:rPr lang="en-US" dirty="0"/>
               <a:t>Effort Estimate Assumptions</a:t>
             </a:r>
-            <a:endParaRPr lang="en-US" dirty="0"/>
           </a:p>
         </p:txBody>
       </p:sp>
@@ -5851,28 +5847,28 @@
                 <a:gridCol w="2743200">
                   <a:extLst>
                     <a:ext uri="{9D8B030D-6E8A-4147-A177-3AD203B41FA5}">
-                      <a16:colId xmlns="" xmlns:a16="http://schemas.microsoft.com/office/drawing/2014/main" val="4007007747"/>
+                      <a16:colId xmlns:a16="http://schemas.microsoft.com/office/drawing/2014/main" xmlns="" val="4007007747"/>
                     </a:ext>
                   </a:extLst>
                 </a:gridCol>
                 <a:gridCol w="2743200">
                   <a:extLst>
                     <a:ext uri="{9D8B030D-6E8A-4147-A177-3AD203B41FA5}">
-                      <a16:colId xmlns="" xmlns:a16="http://schemas.microsoft.com/office/drawing/2014/main" val="2089765381"/>
+                      <a16:colId xmlns:a16="http://schemas.microsoft.com/office/drawing/2014/main" xmlns="" val="2089765381"/>
                     </a:ext>
                   </a:extLst>
                 </a:gridCol>
                 <a:gridCol w="2743200">
                   <a:extLst>
                     <a:ext uri="{9D8B030D-6E8A-4147-A177-3AD203B41FA5}">
-                      <a16:colId xmlns="" xmlns:a16="http://schemas.microsoft.com/office/drawing/2014/main" val="2946535250"/>
+                      <a16:colId xmlns:a16="http://schemas.microsoft.com/office/drawing/2014/main" xmlns="" val="2946535250"/>
                     </a:ext>
                   </a:extLst>
                 </a:gridCol>
                 <a:gridCol w="2743200">
                   <a:extLst>
                     <a:ext uri="{9D8B030D-6E8A-4147-A177-3AD203B41FA5}">
-                      <a16:colId xmlns="" xmlns:a16="http://schemas.microsoft.com/office/drawing/2014/main" val="2232881725"/>
+                      <a16:colId xmlns:a16="http://schemas.microsoft.com/office/drawing/2014/main" xmlns="" val="2232881725"/>
                     </a:ext>
                   </a:extLst>
                 </a:gridCol>
@@ -5936,7 +5932,7 @@
                 </a:tc>
                 <a:extLst>
                   <a:ext uri="{0D108BD9-81ED-4DB2-BD59-A6C34878D82A}">
-                    <a16:rowId xmlns="" xmlns:a16="http://schemas.microsoft.com/office/drawing/2014/main" val="2585052838"/>
+                    <a16:rowId xmlns:a16="http://schemas.microsoft.com/office/drawing/2014/main" xmlns="" val="2585052838"/>
                   </a:ext>
                 </a:extLst>
               </a:tr>
@@ -5997,7 +5993,7 @@
                 </a:tc>
                 <a:extLst>
                   <a:ext uri="{0D108BD9-81ED-4DB2-BD59-A6C34878D82A}">
-                    <a16:rowId xmlns="" xmlns:a16="http://schemas.microsoft.com/office/drawing/2014/main" val="3714616697"/>
+                    <a16:rowId xmlns:a16="http://schemas.microsoft.com/office/drawing/2014/main" xmlns="" val="3714616697"/>
                   </a:ext>
                 </a:extLst>
               </a:tr>
@@ -6064,7 +6060,7 @@
                 </a:tc>
                 <a:extLst>
                   <a:ext uri="{0D108BD9-81ED-4DB2-BD59-A6C34878D82A}">
-                    <a16:rowId xmlns="" xmlns:a16="http://schemas.microsoft.com/office/drawing/2014/main" val="1340422060"/>
+                    <a16:rowId xmlns:a16="http://schemas.microsoft.com/office/drawing/2014/main" xmlns="" val="1340422060"/>
                   </a:ext>
                 </a:extLst>
               </a:tr>
@@ -6131,7 +6127,7 @@
                 </a:tc>
                 <a:extLst>
                   <a:ext uri="{0D108BD9-81ED-4DB2-BD59-A6C34878D82A}">
-                    <a16:rowId xmlns="" xmlns:a16="http://schemas.microsoft.com/office/drawing/2014/main" val="2564084175"/>
+                    <a16:rowId xmlns:a16="http://schemas.microsoft.com/office/drawing/2014/main" xmlns="" val="2564084175"/>
                   </a:ext>
                 </a:extLst>
               </a:tr>
@@ -6198,7 +6194,7 @@
                 </a:tc>
                 <a:extLst>
                   <a:ext uri="{0D108BD9-81ED-4DB2-BD59-A6C34878D82A}">
-                    <a16:rowId xmlns="" xmlns:a16="http://schemas.microsoft.com/office/drawing/2014/main" val="2775949887"/>
+                    <a16:rowId xmlns:a16="http://schemas.microsoft.com/office/drawing/2014/main" xmlns="" val="2775949887"/>
                   </a:ext>
                 </a:extLst>
               </a:tr>
@@ -6262,7 +6258,7 @@
                 </a:tc>
                 <a:extLst>
                   <a:ext uri="{0D108BD9-81ED-4DB2-BD59-A6C34878D82A}">
-                    <a16:rowId xmlns="" xmlns:a16="http://schemas.microsoft.com/office/drawing/2014/main" val="2549268092"/>
+                    <a16:rowId xmlns:a16="http://schemas.microsoft.com/office/drawing/2014/main" xmlns="" val="2549268092"/>
                   </a:ext>
                 </a:extLst>
               </a:tr>
@@ -6326,7 +6322,7 @@
                 </a:tc>
                 <a:extLst>
                   <a:ext uri="{0D108BD9-81ED-4DB2-BD59-A6C34878D82A}">
-                    <a16:rowId xmlns="" xmlns:a16="http://schemas.microsoft.com/office/drawing/2014/main" val="178318549"/>
+                    <a16:rowId xmlns:a16="http://schemas.microsoft.com/office/drawing/2014/main" xmlns="" val="178318549"/>
                   </a:ext>
                 </a:extLst>
               </a:tr>
@@ -6520,21 +6516,50 @@
             <a:pPr lvl="1"/>
             <a:r>
               <a:rPr lang="en-US" dirty="0"/>
-              <a:t>PROD estimate is very low (5)</a:t>
-            </a:r>
+              <a:t>PROD estimate is </a:t>
+            </a:r>
+            <a:r>
+              <a:rPr lang="en-US" dirty="0" smtClean="0"/>
+              <a:t>normal</a:t>
+            </a:r>
+            <a:r>
+              <a:rPr lang="en-US" dirty="0" smtClean="0"/>
+              <a:t> (10)</a:t>
+            </a:r>
+            <a:endParaRPr lang="en-US" dirty="0"/>
           </a:p>
           <a:p>
             <a:pPr lvl="1"/>
             <a:r>
               <a:rPr lang="en-US" dirty="0"/>
-              <a:t>PROD = 160 NOP / 32 person months</a:t>
+              <a:t>PROD = 160 NOP / </a:t>
+            </a:r>
+            <a:r>
+              <a:rPr lang="en-US" dirty="0" smtClean="0"/>
+              <a:t>16</a:t>
+            </a:r>
+            <a:r>
+              <a:rPr lang="en-US" dirty="0" smtClean="0"/>
+              <a:t> </a:t>
+            </a:r>
+            <a:r>
+              <a:rPr lang="en-US" dirty="0"/>
+              <a:t>person months</a:t>
             </a:r>
           </a:p>
           <a:p>
             <a:pPr lvl="1"/>
             <a:r>
               <a:rPr lang="en-US" dirty="0"/>
-              <a:t>PM = 8hr x 1 week x 4 weeks</a:t>
+              <a:t>PM = </a:t>
+            </a:r>
+            <a:r>
+              <a:rPr lang="en-US" dirty="0" smtClean="0"/>
+              <a:t>4hr </a:t>
+            </a:r>
+            <a:r>
+              <a:rPr lang="en-US" dirty="0"/>
+              <a:t>x 1 week x 4 weeks</a:t>
             </a:r>
           </a:p>
           <a:p>
@@ -6568,14 +6593,39 @@
           <a:p>
             <a:r>
               <a:rPr lang="en-US" dirty="0"/>
-              <a:t>Effort Estimate in person months (PM) (PM = 32)</a:t>
-            </a:r>
+              <a:t>Effort Estimate in person months (PM) (PM = </a:t>
+            </a:r>
+            <a:r>
+              <a:rPr lang="en-US" dirty="0" smtClean="0"/>
+              <a:t>16</a:t>
+            </a:r>
+            <a:r>
+              <a:rPr lang="en-US" dirty="0" smtClean="0"/>
+              <a:t>)</a:t>
+            </a:r>
+            <a:endParaRPr lang="en-US" dirty="0"/>
           </a:p>
           <a:p>
             <a:pPr lvl="1"/>
             <a:r>
-              <a:rPr lang="en-US"/>
-              <a:t>Effort(PM) = 159/5 = 31.8 person months</a:t>
+              <a:rPr lang="en-US" dirty="0"/>
+              <a:t>Effort(PM) = 159</a:t>
+            </a:r>
+            <a:r>
+              <a:rPr lang="en-US" dirty="0" smtClean="0"/>
+              <a:t>/10 </a:t>
+            </a:r>
+            <a:r>
+              <a:rPr lang="en-US" dirty="0"/>
+              <a:t>= </a:t>
+            </a:r>
+            <a:r>
+              <a:rPr lang="en-US" dirty="0" smtClean="0"/>
+              <a:t>15.9 </a:t>
+            </a:r>
+            <a:r>
+              <a:rPr lang="en-US" dirty="0"/>
+              <a:t>person months</a:t>
             </a:r>
           </a:p>
         </p:txBody>
@@ -8035,14 +8085,14 @@
                 <a:gridCol w="5486400">
                   <a:extLst>
                     <a:ext uri="{9D8B030D-6E8A-4147-A177-3AD203B41FA5}">
-                      <a16:colId xmlns="" xmlns:a16="http://schemas.microsoft.com/office/drawing/2014/main" val="4024214062"/>
+                      <a16:colId xmlns:a16="http://schemas.microsoft.com/office/drawing/2014/main" xmlns="" val="4024214062"/>
                     </a:ext>
                   </a:extLst>
                 </a:gridCol>
                 <a:gridCol w="5486400">
                   <a:extLst>
                     <a:ext uri="{9D8B030D-6E8A-4147-A177-3AD203B41FA5}">
-                      <a16:colId xmlns="" xmlns:a16="http://schemas.microsoft.com/office/drawing/2014/main" val="1838665537"/>
+                      <a16:colId xmlns:a16="http://schemas.microsoft.com/office/drawing/2014/main" xmlns="" val="1838665537"/>
                     </a:ext>
                   </a:extLst>
                 </a:gridCol>
@@ -8078,7 +8128,7 @@
                 </a:tc>
                 <a:extLst>
                   <a:ext uri="{0D108BD9-81ED-4DB2-BD59-A6C34878D82A}">
-                    <a16:rowId xmlns="" xmlns:a16="http://schemas.microsoft.com/office/drawing/2014/main" val="986279335"/>
+                    <a16:rowId xmlns:a16="http://schemas.microsoft.com/office/drawing/2014/main" xmlns="" val="986279335"/>
                   </a:ext>
                 </a:extLst>
               </a:tr>
@@ -8109,7 +8159,7 @@
                 </a:tc>
                 <a:extLst>
                   <a:ext uri="{0D108BD9-81ED-4DB2-BD59-A6C34878D82A}">
-                    <a16:rowId xmlns="" xmlns:a16="http://schemas.microsoft.com/office/drawing/2014/main" val="2649700066"/>
+                    <a16:rowId xmlns:a16="http://schemas.microsoft.com/office/drawing/2014/main" xmlns="" val="2649700066"/>
                   </a:ext>
                 </a:extLst>
               </a:tr>
@@ -8144,7 +8194,7 @@
                 </a:tc>
                 <a:extLst>
                   <a:ext uri="{0D108BD9-81ED-4DB2-BD59-A6C34878D82A}">
-                    <a16:rowId xmlns="" xmlns:a16="http://schemas.microsoft.com/office/drawing/2014/main" val="3650691391"/>
+                    <a16:rowId xmlns:a16="http://schemas.microsoft.com/office/drawing/2014/main" xmlns="" val="3650691391"/>
                   </a:ext>
                 </a:extLst>
               </a:tr>
@@ -8179,7 +8229,7 @@
                 </a:tc>
                 <a:extLst>
                   <a:ext uri="{0D108BD9-81ED-4DB2-BD59-A6C34878D82A}">
-                    <a16:rowId xmlns="" xmlns:a16="http://schemas.microsoft.com/office/drawing/2014/main" val="3717878835"/>
+                    <a16:rowId xmlns:a16="http://schemas.microsoft.com/office/drawing/2014/main" xmlns="" val="3717878835"/>
                   </a:ext>
                 </a:extLst>
               </a:tr>
@@ -8214,7 +8264,7 @@
                 </a:tc>
                 <a:extLst>
                   <a:ext uri="{0D108BD9-81ED-4DB2-BD59-A6C34878D82A}">
-                    <a16:rowId xmlns="" xmlns:a16="http://schemas.microsoft.com/office/drawing/2014/main" val="304909867"/>
+                    <a16:rowId xmlns:a16="http://schemas.microsoft.com/office/drawing/2014/main" xmlns="" val="304909867"/>
                   </a:ext>
                 </a:extLst>
               </a:tr>
@@ -8253,7 +8303,7 @@
                 </a:tc>
                 <a:extLst>
                   <a:ext uri="{0D108BD9-81ED-4DB2-BD59-A6C34878D82A}">
-                    <a16:rowId xmlns="" xmlns:a16="http://schemas.microsoft.com/office/drawing/2014/main" val="1562380615"/>
+                    <a16:rowId xmlns:a16="http://schemas.microsoft.com/office/drawing/2014/main" xmlns="" val="1562380615"/>
                   </a:ext>
                 </a:extLst>
               </a:tr>
@@ -8288,7 +8338,7 @@
                 </a:tc>
                 <a:extLst>
                   <a:ext uri="{0D108BD9-81ED-4DB2-BD59-A6C34878D82A}">
-                    <a16:rowId xmlns="" xmlns:a16="http://schemas.microsoft.com/office/drawing/2014/main" val="207666318"/>
+                    <a16:rowId xmlns:a16="http://schemas.microsoft.com/office/drawing/2014/main" xmlns="" val="207666318"/>
                   </a:ext>
                 </a:extLst>
               </a:tr>
@@ -8323,7 +8373,7 @@
                 </a:tc>
                 <a:extLst>
                   <a:ext uri="{0D108BD9-81ED-4DB2-BD59-A6C34878D82A}">
-                    <a16:rowId xmlns="" xmlns:a16="http://schemas.microsoft.com/office/drawing/2014/main" val="4219954106"/>
+                    <a16:rowId xmlns:a16="http://schemas.microsoft.com/office/drawing/2014/main" xmlns="" val="4219954106"/>
                   </a:ext>
                 </a:extLst>
               </a:tr>
@@ -8358,7 +8408,7 @@
                 </a:tc>
                 <a:extLst>
                   <a:ext uri="{0D108BD9-81ED-4DB2-BD59-A6C34878D82A}">
-                    <a16:rowId xmlns="" xmlns:a16="http://schemas.microsoft.com/office/drawing/2014/main" val="2908311740"/>
+                    <a16:rowId xmlns:a16="http://schemas.microsoft.com/office/drawing/2014/main" xmlns="" val="2908311740"/>
                   </a:ext>
                 </a:extLst>
               </a:tr>
@@ -8392,7 +8442,7 @@
                 </a:tc>
                 <a:extLst>
                   <a:ext uri="{0D108BD9-81ED-4DB2-BD59-A6C34878D82A}">
-                    <a16:rowId xmlns="" xmlns:a16="http://schemas.microsoft.com/office/drawing/2014/main" val="2041197959"/>
+                    <a16:rowId xmlns:a16="http://schemas.microsoft.com/office/drawing/2014/main" xmlns="" val="2041197959"/>
                   </a:ext>
                 </a:extLst>
               </a:tr>
@@ -8426,7 +8476,7 @@
                 </a:tc>
                 <a:extLst>
                   <a:ext uri="{0D108BD9-81ED-4DB2-BD59-A6C34878D82A}">
-                    <a16:rowId xmlns="" xmlns:a16="http://schemas.microsoft.com/office/drawing/2014/main" val="1620820458"/>
+                    <a16:rowId xmlns:a16="http://schemas.microsoft.com/office/drawing/2014/main" xmlns="" val="1620820458"/>
                   </a:ext>
                 </a:extLst>
               </a:tr>
@@ -8625,14 +8675,14 @@
                 <a:gridCol w="5486400">
                   <a:extLst>
                     <a:ext uri="{9D8B030D-6E8A-4147-A177-3AD203B41FA5}">
-                      <a16:colId xmlns="" xmlns:a16="http://schemas.microsoft.com/office/drawing/2014/main" val="4024214062"/>
+                      <a16:colId xmlns:a16="http://schemas.microsoft.com/office/drawing/2014/main" xmlns="" val="4024214062"/>
                     </a:ext>
                   </a:extLst>
                 </a:gridCol>
                 <a:gridCol w="5486400">
                   <a:extLst>
                     <a:ext uri="{9D8B030D-6E8A-4147-A177-3AD203B41FA5}">
-                      <a16:colId xmlns="" xmlns:a16="http://schemas.microsoft.com/office/drawing/2014/main" val="1838665537"/>
+                      <a16:colId xmlns:a16="http://schemas.microsoft.com/office/drawing/2014/main" xmlns="" val="1838665537"/>
                     </a:ext>
                   </a:extLst>
                 </a:gridCol>
@@ -8664,7 +8714,7 @@
                 </a:tc>
                 <a:extLst>
                   <a:ext uri="{0D108BD9-81ED-4DB2-BD59-A6C34878D82A}">
-                    <a16:rowId xmlns="" xmlns:a16="http://schemas.microsoft.com/office/drawing/2014/main" val="986279335"/>
+                    <a16:rowId xmlns:a16="http://schemas.microsoft.com/office/drawing/2014/main" xmlns="" val="986279335"/>
                   </a:ext>
                 </a:extLst>
               </a:tr>
@@ -8695,7 +8745,7 @@
                 </a:tc>
                 <a:extLst>
                   <a:ext uri="{0D108BD9-81ED-4DB2-BD59-A6C34878D82A}">
-                    <a16:rowId xmlns="" xmlns:a16="http://schemas.microsoft.com/office/drawing/2014/main" val="2649700066"/>
+                    <a16:rowId xmlns:a16="http://schemas.microsoft.com/office/drawing/2014/main" xmlns="" val="2649700066"/>
                   </a:ext>
                 </a:extLst>
               </a:tr>
@@ -8730,7 +8780,7 @@
                 </a:tc>
                 <a:extLst>
                   <a:ext uri="{0D108BD9-81ED-4DB2-BD59-A6C34878D82A}">
-                    <a16:rowId xmlns="" xmlns:a16="http://schemas.microsoft.com/office/drawing/2014/main" val="309961168"/>
+                    <a16:rowId xmlns:a16="http://schemas.microsoft.com/office/drawing/2014/main" xmlns="" val="309961168"/>
                   </a:ext>
                 </a:extLst>
               </a:tr>
@@ -8765,7 +8815,7 @@
                 </a:tc>
                 <a:extLst>
                   <a:ext uri="{0D108BD9-81ED-4DB2-BD59-A6C34878D82A}">
-                    <a16:rowId xmlns="" xmlns:a16="http://schemas.microsoft.com/office/drawing/2014/main" val="1746750848"/>
+                    <a16:rowId xmlns:a16="http://schemas.microsoft.com/office/drawing/2014/main" xmlns="" val="1746750848"/>
                   </a:ext>
                 </a:extLst>
               </a:tr>
@@ -8800,7 +8850,7 @@
                 </a:tc>
                 <a:extLst>
                   <a:ext uri="{0D108BD9-81ED-4DB2-BD59-A6C34878D82A}">
-                    <a16:rowId xmlns="" xmlns:a16="http://schemas.microsoft.com/office/drawing/2014/main" val="2287252683"/>
+                    <a16:rowId xmlns:a16="http://schemas.microsoft.com/office/drawing/2014/main" xmlns="" val="2287252683"/>
                   </a:ext>
                 </a:extLst>
               </a:tr>
@@ -8835,7 +8885,7 @@
                 </a:tc>
                 <a:extLst>
                   <a:ext uri="{0D108BD9-81ED-4DB2-BD59-A6C34878D82A}">
-                    <a16:rowId xmlns="" xmlns:a16="http://schemas.microsoft.com/office/drawing/2014/main" val="3931255069"/>
+                    <a16:rowId xmlns:a16="http://schemas.microsoft.com/office/drawing/2014/main" xmlns="" val="3931255069"/>
                   </a:ext>
                 </a:extLst>
               </a:tr>
@@ -8870,7 +8920,7 @@
                 </a:tc>
                 <a:extLst>
                   <a:ext uri="{0D108BD9-81ED-4DB2-BD59-A6C34878D82A}">
-                    <a16:rowId xmlns="" xmlns:a16="http://schemas.microsoft.com/office/drawing/2014/main" val="3016523529"/>
+                    <a16:rowId xmlns:a16="http://schemas.microsoft.com/office/drawing/2014/main" xmlns="" val="3016523529"/>
                   </a:ext>
                 </a:extLst>
               </a:tr>
@@ -8905,7 +8955,7 @@
                 </a:tc>
                 <a:extLst>
                   <a:ext uri="{0D108BD9-81ED-4DB2-BD59-A6C34878D82A}">
-                    <a16:rowId xmlns="" xmlns:a16="http://schemas.microsoft.com/office/drawing/2014/main" val="3948036698"/>
+                    <a16:rowId xmlns:a16="http://schemas.microsoft.com/office/drawing/2014/main" xmlns="" val="3948036698"/>
                   </a:ext>
                 </a:extLst>
               </a:tr>
@@ -8940,7 +8990,7 @@
                 </a:tc>
                 <a:extLst>
                   <a:ext uri="{0D108BD9-81ED-4DB2-BD59-A6C34878D82A}">
-                    <a16:rowId xmlns="" xmlns:a16="http://schemas.microsoft.com/office/drawing/2014/main" val="1862235874"/>
+                    <a16:rowId xmlns:a16="http://schemas.microsoft.com/office/drawing/2014/main" xmlns="" val="1862235874"/>
                   </a:ext>
                 </a:extLst>
               </a:tr>
@@ -8975,7 +9025,7 @@
                 </a:tc>
                 <a:extLst>
                   <a:ext uri="{0D108BD9-81ED-4DB2-BD59-A6C34878D82A}">
-                    <a16:rowId xmlns="" xmlns:a16="http://schemas.microsoft.com/office/drawing/2014/main" val="1952473074"/>
+                    <a16:rowId xmlns:a16="http://schemas.microsoft.com/office/drawing/2014/main" xmlns="" val="1952473074"/>
                   </a:ext>
                 </a:extLst>
               </a:tr>
@@ -9010,7 +9060,7 @@
                 </a:tc>
                 <a:extLst>
                   <a:ext uri="{0D108BD9-81ED-4DB2-BD59-A6C34878D82A}">
-                    <a16:rowId xmlns="" xmlns:a16="http://schemas.microsoft.com/office/drawing/2014/main" val="3794391533"/>
+                    <a16:rowId xmlns:a16="http://schemas.microsoft.com/office/drawing/2014/main" xmlns="" val="3794391533"/>
                   </a:ext>
                 </a:extLst>
               </a:tr>
@@ -9045,7 +9095,7 @@
                 </a:tc>
                 <a:extLst>
                   <a:ext uri="{0D108BD9-81ED-4DB2-BD59-A6C34878D82A}">
-                    <a16:rowId xmlns="" xmlns:a16="http://schemas.microsoft.com/office/drawing/2014/main" val="4213279396"/>
+                    <a16:rowId xmlns:a16="http://schemas.microsoft.com/office/drawing/2014/main" xmlns="" val="4213279396"/>
                   </a:ext>
                 </a:extLst>
               </a:tr>
@@ -9244,14 +9294,14 @@
                 <a:gridCol w="5486400">
                   <a:extLst>
                     <a:ext uri="{9D8B030D-6E8A-4147-A177-3AD203B41FA5}">
-                      <a16:colId xmlns="" xmlns:a16="http://schemas.microsoft.com/office/drawing/2014/main" val="3661438328"/>
+                      <a16:colId xmlns:a16="http://schemas.microsoft.com/office/drawing/2014/main" xmlns="" val="3661438328"/>
                     </a:ext>
                   </a:extLst>
                 </a:gridCol>
                 <a:gridCol w="5486400">
                   <a:extLst>
                     <a:ext uri="{9D8B030D-6E8A-4147-A177-3AD203B41FA5}">
-                      <a16:colId xmlns="" xmlns:a16="http://schemas.microsoft.com/office/drawing/2014/main" val="2462084561"/>
+                      <a16:colId xmlns:a16="http://schemas.microsoft.com/office/drawing/2014/main" xmlns="" val="2462084561"/>
                     </a:ext>
                   </a:extLst>
                 </a:gridCol>
@@ -9287,7 +9337,7 @@
                 </a:tc>
                 <a:extLst>
                   <a:ext uri="{0D108BD9-81ED-4DB2-BD59-A6C34878D82A}">
-                    <a16:rowId xmlns="" xmlns:a16="http://schemas.microsoft.com/office/drawing/2014/main" val="2830022487"/>
+                    <a16:rowId xmlns:a16="http://schemas.microsoft.com/office/drawing/2014/main" xmlns="" val="2830022487"/>
                   </a:ext>
                 </a:extLst>
               </a:tr>
@@ -9322,7 +9372,7 @@
                 </a:tc>
                 <a:extLst>
                   <a:ext uri="{0D108BD9-81ED-4DB2-BD59-A6C34878D82A}">
-                    <a16:rowId xmlns="" xmlns:a16="http://schemas.microsoft.com/office/drawing/2014/main" val="3462792300"/>
+                    <a16:rowId xmlns:a16="http://schemas.microsoft.com/office/drawing/2014/main" xmlns="" val="3462792300"/>
                   </a:ext>
                 </a:extLst>
               </a:tr>
@@ -9365,7 +9415,7 @@
                 </a:tc>
                 <a:extLst>
                   <a:ext uri="{0D108BD9-81ED-4DB2-BD59-A6C34878D82A}">
-                    <a16:rowId xmlns="" xmlns:a16="http://schemas.microsoft.com/office/drawing/2014/main" val="3061581558"/>
+                    <a16:rowId xmlns:a16="http://schemas.microsoft.com/office/drawing/2014/main" xmlns="" val="3061581558"/>
                   </a:ext>
                 </a:extLst>
               </a:tr>
@@ -9416,7 +9466,7 @@
                 </a:tc>
                 <a:extLst>
                   <a:ext uri="{0D108BD9-81ED-4DB2-BD59-A6C34878D82A}">
-                    <a16:rowId xmlns="" xmlns:a16="http://schemas.microsoft.com/office/drawing/2014/main" val="742086977"/>
+                    <a16:rowId xmlns:a16="http://schemas.microsoft.com/office/drawing/2014/main" xmlns="" val="742086977"/>
                   </a:ext>
                 </a:extLst>
               </a:tr>
@@ -9455,7 +9505,7 @@
                 </a:tc>
                 <a:extLst>
                   <a:ext uri="{0D108BD9-81ED-4DB2-BD59-A6C34878D82A}">
-                    <a16:rowId xmlns="" xmlns:a16="http://schemas.microsoft.com/office/drawing/2014/main" val="2361850435"/>
+                    <a16:rowId xmlns:a16="http://schemas.microsoft.com/office/drawing/2014/main" xmlns="" val="2361850435"/>
                   </a:ext>
                 </a:extLst>
               </a:tr>
@@ -9498,7 +9548,7 @@
                 </a:tc>
                 <a:extLst>
                   <a:ext uri="{0D108BD9-81ED-4DB2-BD59-A6C34878D82A}">
-                    <a16:rowId xmlns="" xmlns:a16="http://schemas.microsoft.com/office/drawing/2014/main" val="2876776749"/>
+                    <a16:rowId xmlns:a16="http://schemas.microsoft.com/office/drawing/2014/main" xmlns="" val="2876776749"/>
                   </a:ext>
                 </a:extLst>
               </a:tr>
@@ -9533,7 +9583,7 @@
                 </a:tc>
                 <a:extLst>
                   <a:ext uri="{0D108BD9-81ED-4DB2-BD59-A6C34878D82A}">
-                    <a16:rowId xmlns="" xmlns:a16="http://schemas.microsoft.com/office/drawing/2014/main" val="2847548840"/>
+                    <a16:rowId xmlns:a16="http://schemas.microsoft.com/office/drawing/2014/main" xmlns="" val="2847548840"/>
                   </a:ext>
                 </a:extLst>
               </a:tr>
@@ -9572,7 +9622,7 @@
                 </a:tc>
                 <a:extLst>
                   <a:ext uri="{0D108BD9-81ED-4DB2-BD59-A6C34878D82A}">
-                    <a16:rowId xmlns="" xmlns:a16="http://schemas.microsoft.com/office/drawing/2014/main" val="1662843150"/>
+                    <a16:rowId xmlns:a16="http://schemas.microsoft.com/office/drawing/2014/main" xmlns="" val="1662843150"/>
                   </a:ext>
                 </a:extLst>
               </a:tr>
@@ -9771,28 +9821,28 @@
                 <a:gridCol w="2743200">
                   <a:extLst>
                     <a:ext uri="{9D8B030D-6E8A-4147-A177-3AD203B41FA5}">
-                      <a16:colId xmlns="" xmlns:a16="http://schemas.microsoft.com/office/drawing/2014/main" val="4007007747"/>
+                      <a16:colId xmlns:a16="http://schemas.microsoft.com/office/drawing/2014/main" xmlns="" val="4007007747"/>
                     </a:ext>
                   </a:extLst>
                 </a:gridCol>
                 <a:gridCol w="2743200">
                   <a:extLst>
                     <a:ext uri="{9D8B030D-6E8A-4147-A177-3AD203B41FA5}">
-                      <a16:colId xmlns="" xmlns:a16="http://schemas.microsoft.com/office/drawing/2014/main" val="2089765381"/>
+                      <a16:colId xmlns:a16="http://schemas.microsoft.com/office/drawing/2014/main" xmlns="" val="2089765381"/>
                     </a:ext>
                   </a:extLst>
                 </a:gridCol>
                 <a:gridCol w="2743200">
                   <a:extLst>
                     <a:ext uri="{9D8B030D-6E8A-4147-A177-3AD203B41FA5}">
-                      <a16:colId xmlns="" xmlns:a16="http://schemas.microsoft.com/office/drawing/2014/main" val="2946535250"/>
+                      <a16:colId xmlns:a16="http://schemas.microsoft.com/office/drawing/2014/main" xmlns="" val="2946535250"/>
                     </a:ext>
                   </a:extLst>
                 </a:gridCol>
                 <a:gridCol w="2743200">
                   <a:extLst>
                     <a:ext uri="{9D8B030D-6E8A-4147-A177-3AD203B41FA5}">
-                      <a16:colId xmlns="" xmlns:a16="http://schemas.microsoft.com/office/drawing/2014/main" val="2232881725"/>
+                      <a16:colId xmlns:a16="http://schemas.microsoft.com/office/drawing/2014/main" xmlns="" val="2232881725"/>
                     </a:ext>
                   </a:extLst>
                 </a:gridCol>
@@ -9856,7 +9906,7 @@
                 </a:tc>
                 <a:extLst>
                   <a:ext uri="{0D108BD9-81ED-4DB2-BD59-A6C34878D82A}">
-                    <a16:rowId xmlns="" xmlns:a16="http://schemas.microsoft.com/office/drawing/2014/main" val="2585052838"/>
+                    <a16:rowId xmlns:a16="http://schemas.microsoft.com/office/drawing/2014/main" xmlns="" val="2585052838"/>
                   </a:ext>
                 </a:extLst>
               </a:tr>
@@ -9923,7 +9973,7 @@
                 </a:tc>
                 <a:extLst>
                   <a:ext uri="{0D108BD9-81ED-4DB2-BD59-A6C34878D82A}">
-                    <a16:rowId xmlns="" xmlns:a16="http://schemas.microsoft.com/office/drawing/2014/main" val="1152342311"/>
+                    <a16:rowId xmlns:a16="http://schemas.microsoft.com/office/drawing/2014/main" xmlns="" val="1152342311"/>
                   </a:ext>
                 </a:extLst>
               </a:tr>
@@ -9990,7 +10040,7 @@
                 </a:tc>
                 <a:extLst>
                   <a:ext uri="{0D108BD9-81ED-4DB2-BD59-A6C34878D82A}">
-                    <a16:rowId xmlns="" xmlns:a16="http://schemas.microsoft.com/office/drawing/2014/main" val="2957515265"/>
+                    <a16:rowId xmlns:a16="http://schemas.microsoft.com/office/drawing/2014/main" xmlns="" val="2957515265"/>
                   </a:ext>
                 </a:extLst>
               </a:tr>
@@ -10189,28 +10239,28 @@
                 <a:gridCol w="2743200">
                   <a:extLst>
                     <a:ext uri="{9D8B030D-6E8A-4147-A177-3AD203B41FA5}">
-                      <a16:colId xmlns="" xmlns:a16="http://schemas.microsoft.com/office/drawing/2014/main" val="4007007747"/>
+                      <a16:colId xmlns:a16="http://schemas.microsoft.com/office/drawing/2014/main" xmlns="" val="4007007747"/>
                     </a:ext>
                   </a:extLst>
                 </a:gridCol>
                 <a:gridCol w="2743200">
                   <a:extLst>
                     <a:ext uri="{9D8B030D-6E8A-4147-A177-3AD203B41FA5}">
-                      <a16:colId xmlns="" xmlns:a16="http://schemas.microsoft.com/office/drawing/2014/main" val="2089765381"/>
+                      <a16:colId xmlns:a16="http://schemas.microsoft.com/office/drawing/2014/main" xmlns="" val="2089765381"/>
                     </a:ext>
                   </a:extLst>
                 </a:gridCol>
                 <a:gridCol w="2743200">
                   <a:extLst>
                     <a:ext uri="{9D8B030D-6E8A-4147-A177-3AD203B41FA5}">
-                      <a16:colId xmlns="" xmlns:a16="http://schemas.microsoft.com/office/drawing/2014/main" val="2946535250"/>
+                      <a16:colId xmlns:a16="http://schemas.microsoft.com/office/drawing/2014/main" xmlns="" val="2946535250"/>
                     </a:ext>
                   </a:extLst>
                 </a:gridCol>
                 <a:gridCol w="2743200">
                   <a:extLst>
                     <a:ext uri="{9D8B030D-6E8A-4147-A177-3AD203B41FA5}">
-                      <a16:colId xmlns="" xmlns:a16="http://schemas.microsoft.com/office/drawing/2014/main" val="2232881725"/>
+                      <a16:colId xmlns:a16="http://schemas.microsoft.com/office/drawing/2014/main" xmlns="" val="2232881725"/>
                     </a:ext>
                   </a:extLst>
                 </a:gridCol>
@@ -10274,7 +10324,7 @@
                 </a:tc>
                 <a:extLst>
                   <a:ext uri="{0D108BD9-81ED-4DB2-BD59-A6C34878D82A}">
-                    <a16:rowId xmlns="" xmlns:a16="http://schemas.microsoft.com/office/drawing/2014/main" val="2585052838"/>
+                    <a16:rowId xmlns:a16="http://schemas.microsoft.com/office/drawing/2014/main" xmlns="" val="2585052838"/>
                   </a:ext>
                 </a:extLst>
               </a:tr>
@@ -10341,7 +10391,7 @@
                 </a:tc>
                 <a:extLst>
                   <a:ext uri="{0D108BD9-81ED-4DB2-BD59-A6C34878D82A}">
-                    <a16:rowId xmlns="" xmlns:a16="http://schemas.microsoft.com/office/drawing/2014/main" val="3190619547"/>
+                    <a16:rowId xmlns:a16="http://schemas.microsoft.com/office/drawing/2014/main" xmlns="" val="3190619547"/>
                   </a:ext>
                 </a:extLst>
               </a:tr>
@@ -10402,7 +10452,7 @@
                 </a:tc>
                 <a:extLst>
                   <a:ext uri="{0D108BD9-81ED-4DB2-BD59-A6C34878D82A}">
-                    <a16:rowId xmlns="" xmlns:a16="http://schemas.microsoft.com/office/drawing/2014/main" val="1767920701"/>
+                    <a16:rowId xmlns:a16="http://schemas.microsoft.com/office/drawing/2014/main" xmlns="" val="1767920701"/>
                   </a:ext>
                 </a:extLst>
               </a:tr>
@@ -10469,7 +10519,7 @@
                 </a:tc>
                 <a:extLst>
                   <a:ext uri="{0D108BD9-81ED-4DB2-BD59-A6C34878D82A}">
-                    <a16:rowId xmlns="" xmlns:a16="http://schemas.microsoft.com/office/drawing/2014/main" val="1045687176"/>
+                    <a16:rowId xmlns:a16="http://schemas.microsoft.com/office/drawing/2014/main" xmlns="" val="1045687176"/>
                   </a:ext>
                 </a:extLst>
               </a:tr>
@@ -10536,7 +10586,7 @@
                 </a:tc>
                 <a:extLst>
                   <a:ext uri="{0D108BD9-81ED-4DB2-BD59-A6C34878D82A}">
-                    <a16:rowId xmlns="" xmlns:a16="http://schemas.microsoft.com/office/drawing/2014/main" val="2351577163"/>
+                    <a16:rowId xmlns:a16="http://schemas.microsoft.com/office/drawing/2014/main" xmlns="" val="2351577163"/>
                   </a:ext>
                 </a:extLst>
               </a:tr>
@@ -10603,7 +10653,7 @@
                 </a:tc>
                 <a:extLst>
                   <a:ext uri="{0D108BD9-81ED-4DB2-BD59-A6C34878D82A}">
-                    <a16:rowId xmlns="" xmlns:a16="http://schemas.microsoft.com/office/drawing/2014/main" val="3050760200"/>
+                    <a16:rowId xmlns:a16="http://schemas.microsoft.com/office/drawing/2014/main" xmlns="" val="3050760200"/>
                   </a:ext>
                 </a:extLst>
               </a:tr>
@@ -10769,7 +10819,6 @@
               <a:rPr lang="en-US" dirty="0"/>
               <a:t>Effort Estimate Assumptions</a:t>
             </a:r>
-            <a:endParaRPr lang="en-US" dirty="0"/>
           </a:p>
         </p:txBody>
       </p:sp>
@@ -10802,28 +10851,28 @@
                 <a:gridCol w="2743200">
                   <a:extLst>
                     <a:ext uri="{9D8B030D-6E8A-4147-A177-3AD203B41FA5}">
-                      <a16:colId xmlns="" xmlns:a16="http://schemas.microsoft.com/office/drawing/2014/main" val="4007007747"/>
+                      <a16:colId xmlns:a16="http://schemas.microsoft.com/office/drawing/2014/main" xmlns="" val="4007007747"/>
                     </a:ext>
                   </a:extLst>
                 </a:gridCol>
                 <a:gridCol w="2743200">
                   <a:extLst>
                     <a:ext uri="{9D8B030D-6E8A-4147-A177-3AD203B41FA5}">
-                      <a16:colId xmlns="" xmlns:a16="http://schemas.microsoft.com/office/drawing/2014/main" val="2089765381"/>
+                      <a16:colId xmlns:a16="http://schemas.microsoft.com/office/drawing/2014/main" xmlns="" val="2089765381"/>
                     </a:ext>
                   </a:extLst>
                 </a:gridCol>
                 <a:gridCol w="2743200">
                   <a:extLst>
                     <a:ext uri="{9D8B030D-6E8A-4147-A177-3AD203B41FA5}">
-                      <a16:colId xmlns="" xmlns:a16="http://schemas.microsoft.com/office/drawing/2014/main" val="2946535250"/>
+                      <a16:colId xmlns:a16="http://schemas.microsoft.com/office/drawing/2014/main" xmlns="" val="2946535250"/>
                     </a:ext>
                   </a:extLst>
                 </a:gridCol>
                 <a:gridCol w="2743200">
                   <a:extLst>
                     <a:ext uri="{9D8B030D-6E8A-4147-A177-3AD203B41FA5}">
-                      <a16:colId xmlns="" xmlns:a16="http://schemas.microsoft.com/office/drawing/2014/main" val="2232881725"/>
+                      <a16:colId xmlns:a16="http://schemas.microsoft.com/office/drawing/2014/main" xmlns="" val="2232881725"/>
                     </a:ext>
                   </a:extLst>
                 </a:gridCol>
@@ -10887,7 +10936,7 @@
                 </a:tc>
                 <a:extLst>
                   <a:ext uri="{0D108BD9-81ED-4DB2-BD59-A6C34878D82A}">
-                    <a16:rowId xmlns="" xmlns:a16="http://schemas.microsoft.com/office/drawing/2014/main" val="2585052838"/>
+                    <a16:rowId xmlns:a16="http://schemas.microsoft.com/office/drawing/2014/main" xmlns="" val="2585052838"/>
                   </a:ext>
                 </a:extLst>
               </a:tr>
@@ -10954,7 +11003,7 @@
                 </a:tc>
                 <a:extLst>
                   <a:ext uri="{0D108BD9-81ED-4DB2-BD59-A6C34878D82A}">
-                    <a16:rowId xmlns="" xmlns:a16="http://schemas.microsoft.com/office/drawing/2014/main" val="4002715652"/>
+                    <a16:rowId xmlns:a16="http://schemas.microsoft.com/office/drawing/2014/main" xmlns="" val="4002715652"/>
                   </a:ext>
                 </a:extLst>
               </a:tr>
@@ -11015,7 +11064,7 @@
                 </a:tc>
                 <a:extLst>
                   <a:ext uri="{0D108BD9-81ED-4DB2-BD59-A6C34878D82A}">
-                    <a16:rowId xmlns="" xmlns:a16="http://schemas.microsoft.com/office/drawing/2014/main" val="2947406717"/>
+                    <a16:rowId xmlns:a16="http://schemas.microsoft.com/office/drawing/2014/main" xmlns="" val="2947406717"/>
                   </a:ext>
                 </a:extLst>
               </a:tr>
@@ -11082,7 +11131,7 @@
                 </a:tc>
                 <a:extLst>
                   <a:ext uri="{0D108BD9-81ED-4DB2-BD59-A6C34878D82A}">
-                    <a16:rowId xmlns="" xmlns:a16="http://schemas.microsoft.com/office/drawing/2014/main" val="864418350"/>
+                    <a16:rowId xmlns:a16="http://schemas.microsoft.com/office/drawing/2014/main" xmlns="" val="864418350"/>
                   </a:ext>
                 </a:extLst>
               </a:tr>
@@ -11474,7 +11523,7 @@
   <a:extraClrSchemeLst/>
   <a:extLst>
     <a:ext uri="{05A4C25C-085E-4340-85A3-A5531E510DB2}">
-      <thm15:themeFamily xmlns="" xmlns:thm15="http://schemas.microsoft.com/office/thememl/2012/main" name="Company background presentation" id="{7C18907C-4901-42BD-8F2C-E63B32C9DCA3}" vid="{B4FC953D-0C69-4290-95E2-4EA0E2E67DEC}"/>
+      <thm15:themeFamily xmlns:thm15="http://schemas.microsoft.com/office/thememl/2012/main" xmlns="" name="Company background presentation" id="{7C18907C-4901-42BD-8F2C-E63B32C9DCA3}" vid="{B4FC953D-0C69-4290-95E2-4EA0E2E67DEC}"/>
     </a:ext>
   </a:extLst>
 </a:theme>
@@ -11735,7 +11784,7 @@
   <a:extraClrSchemeLst/>
   <a:extLst>
     <a:ext uri="{05A4C25C-085E-4340-85A3-A5531E510DB2}">
-      <thm15:themeFamily xmlns="" xmlns:thm15="http://schemas.microsoft.com/office/thememl/2012/main" name="Office Theme" id="{62F939B6-93AF-4DB8-9C6B-D6C7DFDC589F}" vid="{4A3C46E8-61CC-4603-A589-7422A47A8E4A}"/>
+      <thm15:themeFamily xmlns:thm15="http://schemas.microsoft.com/office/thememl/2012/main" xmlns="" name="Office Theme" id="{62F939B6-93AF-4DB8-9C6B-D6C7DFDC589F}" vid="{4A3C46E8-61CC-4603-A589-7422A47A8E4A}"/>
     </a:ext>
   </a:extLst>
 </a:theme>
@@ -11996,7 +12045,7 @@
   <a:extraClrSchemeLst/>
   <a:extLst>
     <a:ext uri="{05A4C25C-085E-4340-85A3-A5531E510DB2}">
-      <thm15:themeFamily xmlns="" xmlns:thm15="http://schemas.microsoft.com/office/thememl/2012/main" name="Office Theme" id="{62F939B6-93AF-4DB8-9C6B-D6C7DFDC589F}" vid="{4A3C46E8-61CC-4603-A589-7422A47A8E4A}"/>
+      <thm15:themeFamily xmlns:thm15="http://schemas.microsoft.com/office/thememl/2012/main" xmlns="" name="Office Theme" id="{62F939B6-93AF-4DB8-9C6B-D6C7DFDC589F}" vid="{4A3C46E8-61CC-4603-A589-7422A47A8E4A}"/>
     </a:ext>
   </a:extLst>
 </a:theme>

</xml_diff>

<commit_message>
Small change in security risks and side 10
</commit_message>
<xml_diff>
--- a/Presentation1.pptx
+++ b/Presentation1.pptx
@@ -129,10 +129,21 @@
   </p:defaultTextStyle>
   <p:extLst>
     <p:ext uri="{EFAFB233-063F-42B5-8137-9DF3F51BA10A}">
-      <p15:sldGuideLst xmlns="" xmlns:p15="http://schemas.microsoft.com/office/powerpoint/2012/main"/>
+      <p15:sldGuideLst xmlns:p15="http://schemas.microsoft.com/office/powerpoint/2012/main">
+        <p15:guide id="1" orient="horz" pos="2160">
+          <p15:clr>
+            <a:srgbClr val="A4A3A4"/>
+          </p15:clr>
+        </p15:guide>
+        <p15:guide id="2" pos="3840">
+          <p15:clr>
+            <a:srgbClr val="A4A3A4"/>
+          </p15:clr>
+        </p15:guide>
+      </p15:sldGuideLst>
     </p:ext>
     <p:ext uri="{2D200454-40CA-4A62-9FC3-DE9A4176ACB9}">
-      <p15:notesGuideLst xmlns="" xmlns:p15="http://schemas.microsoft.com/office/powerpoint/2012/main"/>
+      <p15:notesGuideLst xmlns:p15="http://schemas.microsoft.com/office/powerpoint/2012/main"/>
     </p:ext>
   </p:extLst>
 </p:presentation>
@@ -3886,7 +3897,7 @@
   <p:timing>
     <p:tnLst>
       <p:par>
-        <p:cTn xmlns:p14="http://schemas.microsoft.com/office/powerpoint/2010/main" id="1" dur="indefinite" restart="never" nodeType="tmRoot"/>
+        <p:cTn id="1" dur="indefinite" restart="never" nodeType="tmRoot"/>
       </p:par>
     </p:tnLst>
   </p:timing>
@@ -4269,7 +4280,7 @@
   <p:timing>
     <p:tnLst>
       <p:par>
-        <p:cTn xmlns:p14="http://schemas.microsoft.com/office/powerpoint/2010/main" id="1" dur="indefinite" restart="never" nodeType="tmRoot"/>
+        <p:cTn id="1" dur="indefinite" restart="never" nodeType="tmRoot"/>
       </p:par>
     </p:tnLst>
   </p:timing>
@@ -4325,14 +4336,14 @@
             <p:ph idx="1"/>
             <p:extLst>
               <p:ext uri="{D42A27DB-BD31-4B8C-83A1-F6EECF244321}">
-                <p14:modId xmlns:p14="http://schemas.microsoft.com/office/powerpoint/2010/main" val="1546207687"/>
+                <p14:modId xmlns:p14="http://schemas.microsoft.com/office/powerpoint/2010/main" val="1934685410"/>
               </p:ext>
             </p:extLst>
           </p:nvPr>
         </p:nvGraphicFramePr>
         <p:xfrm>
           <a:off x="609600" y="1600200"/>
-          <a:ext cx="10972800" cy="2908299"/>
+          <a:ext cx="10972800" cy="2908300"/>
         </p:xfrm>
         <a:graphic>
           <a:graphicData uri="http://schemas.openxmlformats.org/drawingml/2006/table">
@@ -4344,28 +4355,28 @@
                 <a:gridCol w="2743200">
                   <a:extLst>
                     <a:ext uri="{9D8B030D-6E8A-4147-A177-3AD203B41FA5}">
-                      <a16:colId xmlns="" xmlns:a16="http://schemas.microsoft.com/office/drawing/2014/main" val="4007007747"/>
+                      <a16:colId xmlns:a16="http://schemas.microsoft.com/office/drawing/2014/main" xmlns="" val="4007007747"/>
                     </a:ext>
                   </a:extLst>
                 </a:gridCol>
                 <a:gridCol w="2743200">
                   <a:extLst>
                     <a:ext uri="{9D8B030D-6E8A-4147-A177-3AD203B41FA5}">
-                      <a16:colId xmlns="" xmlns:a16="http://schemas.microsoft.com/office/drawing/2014/main" val="2089765381"/>
+                      <a16:colId xmlns:a16="http://schemas.microsoft.com/office/drawing/2014/main" xmlns="" val="2089765381"/>
                     </a:ext>
                   </a:extLst>
                 </a:gridCol>
                 <a:gridCol w="2743200">
                   <a:extLst>
                     <a:ext uri="{9D8B030D-6E8A-4147-A177-3AD203B41FA5}">
-                      <a16:colId xmlns="" xmlns:a16="http://schemas.microsoft.com/office/drawing/2014/main" val="2946535250"/>
+                      <a16:colId xmlns:a16="http://schemas.microsoft.com/office/drawing/2014/main" xmlns="" val="2946535250"/>
                     </a:ext>
                   </a:extLst>
                 </a:gridCol>
                 <a:gridCol w="2743200">
                   <a:extLst>
                     <a:ext uri="{9D8B030D-6E8A-4147-A177-3AD203B41FA5}">
-                      <a16:colId xmlns="" xmlns:a16="http://schemas.microsoft.com/office/drawing/2014/main" val="2232881725"/>
+                      <a16:colId xmlns:a16="http://schemas.microsoft.com/office/drawing/2014/main" xmlns="" val="2232881725"/>
                     </a:ext>
                   </a:extLst>
                 </a:gridCol>
@@ -4429,7 +4440,7 @@
                 </a:tc>
                 <a:extLst>
                   <a:ext uri="{0D108BD9-81ED-4DB2-BD59-A6C34878D82A}">
-                    <a16:rowId xmlns="" xmlns:a16="http://schemas.microsoft.com/office/drawing/2014/main" val="2585052838"/>
+                    <a16:rowId xmlns:a16="http://schemas.microsoft.com/office/drawing/2014/main" xmlns="" val="2585052838"/>
                   </a:ext>
                 </a:extLst>
               </a:tr>
@@ -4496,7 +4507,7 @@
                 </a:tc>
                 <a:extLst>
                   <a:ext uri="{0D108BD9-81ED-4DB2-BD59-A6C34878D82A}">
-                    <a16:rowId xmlns="" xmlns:a16="http://schemas.microsoft.com/office/drawing/2014/main" val="4002715652"/>
+                    <a16:rowId xmlns:a16="http://schemas.microsoft.com/office/drawing/2014/main" xmlns="" val="4002715652"/>
                   </a:ext>
                 </a:extLst>
               </a:tr>
@@ -4557,7 +4568,7 @@
                 </a:tc>
                 <a:extLst>
                   <a:ext uri="{0D108BD9-81ED-4DB2-BD59-A6C34878D82A}">
-                    <a16:rowId xmlns="" xmlns:a16="http://schemas.microsoft.com/office/drawing/2014/main" val="2947406717"/>
+                    <a16:rowId xmlns:a16="http://schemas.microsoft.com/office/drawing/2014/main" xmlns="" val="2947406717"/>
                   </a:ext>
                 </a:extLst>
               </a:tr>
@@ -4568,11 +4579,32 @@
                     <a:lstStyle/>
                     <a:p>
                       <a:r>
+                        <a:rPr lang="en-US" dirty="0">
+                          <a:effectLst/>
+                        </a:rPr>
+                        <a:t>Read </a:t>
+                      </a:r>
+                      <a:r>
                         <a:rPr lang="en-US">
                           <a:effectLst/>
                         </a:rPr>
-                        <a:t>Read About Repurposed Pieces</a:t>
-                      </a:r>
+                        <a:t>About </a:t>
+                      </a:r>
+                      <a:r>
+                        <a:rPr lang="en-US" smtClean="0">
+                          <a:effectLst/>
+                        </a:rPr>
+                        <a:t>Building</a:t>
+                      </a:r>
+                      <a:r>
+                        <a:rPr lang="en-US" baseline="0" smtClean="0">
+                          <a:effectLst/>
+                        </a:rPr>
+                        <a:t> </a:t>
+                      </a:r>
+                      <a:endParaRPr lang="en-US" dirty="0">
+                        <a:effectLst/>
+                      </a:endParaRPr>
                     </a:p>
                   </a:txBody>
                   <a:tcPr marL="123825" marR="123825" marT="57150" marB="57150" anchor="ctr"/>
@@ -4624,7 +4656,7 @@
                 </a:tc>
                 <a:extLst>
                   <a:ext uri="{0D108BD9-81ED-4DB2-BD59-A6C34878D82A}">
-                    <a16:rowId xmlns="" xmlns:a16="http://schemas.microsoft.com/office/drawing/2014/main" val="864418350"/>
+                    <a16:rowId xmlns:a16="http://schemas.microsoft.com/office/drawing/2014/main" xmlns="" val="864418350"/>
                   </a:ext>
                 </a:extLst>
               </a:tr>
@@ -4747,7 +4779,7 @@
   <p:timing>
     <p:tnLst>
       <p:par>
-        <p:cTn xmlns:p14="http://schemas.microsoft.com/office/powerpoint/2010/main" id="1" dur="indefinite" restart="never" nodeType="tmRoot"/>
+        <p:cTn id="1" dur="indefinite" restart="never" nodeType="tmRoot"/>
       </p:par>
     </p:tnLst>
   </p:timing>
@@ -4810,7 +4842,7 @@
         </p:nvGraphicFramePr>
         <p:xfrm>
           <a:off x="609600" y="1600200"/>
-          <a:ext cx="10972800" cy="3182619"/>
+          <a:ext cx="10972800" cy="3182620"/>
         </p:xfrm>
         <a:graphic>
           <a:graphicData uri="http://schemas.openxmlformats.org/drawingml/2006/table">
@@ -4822,28 +4854,28 @@
                 <a:gridCol w="2743200">
                   <a:extLst>
                     <a:ext uri="{9D8B030D-6E8A-4147-A177-3AD203B41FA5}">
-                      <a16:colId xmlns="" xmlns:a16="http://schemas.microsoft.com/office/drawing/2014/main" val="4007007747"/>
+                      <a16:colId xmlns:a16="http://schemas.microsoft.com/office/drawing/2014/main" xmlns="" val="4007007747"/>
                     </a:ext>
                   </a:extLst>
                 </a:gridCol>
                 <a:gridCol w="2743200">
                   <a:extLst>
                     <a:ext uri="{9D8B030D-6E8A-4147-A177-3AD203B41FA5}">
-                      <a16:colId xmlns="" xmlns:a16="http://schemas.microsoft.com/office/drawing/2014/main" val="2089765381"/>
+                      <a16:colId xmlns:a16="http://schemas.microsoft.com/office/drawing/2014/main" xmlns="" val="2089765381"/>
                     </a:ext>
                   </a:extLst>
                 </a:gridCol>
                 <a:gridCol w="2743200">
                   <a:extLst>
                     <a:ext uri="{9D8B030D-6E8A-4147-A177-3AD203B41FA5}">
-                      <a16:colId xmlns="" xmlns:a16="http://schemas.microsoft.com/office/drawing/2014/main" val="2946535250"/>
+                      <a16:colId xmlns:a16="http://schemas.microsoft.com/office/drawing/2014/main" xmlns="" val="2946535250"/>
                     </a:ext>
                   </a:extLst>
                 </a:gridCol>
                 <a:gridCol w="2743200">
                   <a:extLst>
                     <a:ext uri="{9D8B030D-6E8A-4147-A177-3AD203B41FA5}">
-                      <a16:colId xmlns="" xmlns:a16="http://schemas.microsoft.com/office/drawing/2014/main" val="2232881725"/>
+                      <a16:colId xmlns:a16="http://schemas.microsoft.com/office/drawing/2014/main" xmlns="" val="2232881725"/>
                     </a:ext>
                   </a:extLst>
                 </a:gridCol>
@@ -4907,7 +4939,7 @@
                 </a:tc>
                 <a:extLst>
                   <a:ext uri="{0D108BD9-81ED-4DB2-BD59-A6C34878D82A}">
-                    <a16:rowId xmlns="" xmlns:a16="http://schemas.microsoft.com/office/drawing/2014/main" val="2585052838"/>
+                    <a16:rowId xmlns:a16="http://schemas.microsoft.com/office/drawing/2014/main" xmlns="" val="2585052838"/>
                   </a:ext>
                 </a:extLst>
               </a:tr>
@@ -4974,7 +5006,7 @@
                 </a:tc>
                 <a:extLst>
                   <a:ext uri="{0D108BD9-81ED-4DB2-BD59-A6C34878D82A}">
-                    <a16:rowId xmlns="" xmlns:a16="http://schemas.microsoft.com/office/drawing/2014/main" val="2440870835"/>
+                    <a16:rowId xmlns:a16="http://schemas.microsoft.com/office/drawing/2014/main" xmlns="" val="2440870835"/>
                   </a:ext>
                 </a:extLst>
               </a:tr>
@@ -5035,7 +5067,7 @@
                 </a:tc>
                 <a:extLst>
                   <a:ext uri="{0D108BD9-81ED-4DB2-BD59-A6C34878D82A}">
-                    <a16:rowId xmlns="" xmlns:a16="http://schemas.microsoft.com/office/drawing/2014/main" val="3880781591"/>
+                    <a16:rowId xmlns:a16="http://schemas.microsoft.com/office/drawing/2014/main" xmlns="" val="3880781591"/>
                   </a:ext>
                 </a:extLst>
               </a:tr>
@@ -5102,7 +5134,7 @@
                 </a:tc>
                 <a:extLst>
                   <a:ext uri="{0D108BD9-81ED-4DB2-BD59-A6C34878D82A}">
-                    <a16:rowId xmlns="" xmlns:a16="http://schemas.microsoft.com/office/drawing/2014/main" val="4195087847"/>
+                    <a16:rowId xmlns:a16="http://schemas.microsoft.com/office/drawing/2014/main" xmlns="" val="4195087847"/>
                   </a:ext>
                 </a:extLst>
               </a:tr>
@@ -5225,7 +5257,7 @@
   <p:timing>
     <p:tnLst>
       <p:par>
-        <p:cTn xmlns:p14="http://schemas.microsoft.com/office/powerpoint/2010/main" id="1" dur="indefinite" restart="never" nodeType="tmRoot"/>
+        <p:cTn id="1" dur="indefinite" restart="never" nodeType="tmRoot"/>
       </p:par>
     </p:tnLst>
   </p:timing>
@@ -5288,7 +5320,7 @@
         </p:nvGraphicFramePr>
         <p:xfrm>
           <a:off x="609600" y="1600200"/>
-          <a:ext cx="10972800" cy="3182619"/>
+          <a:ext cx="10972800" cy="3182620"/>
         </p:xfrm>
         <a:graphic>
           <a:graphicData uri="http://schemas.openxmlformats.org/drawingml/2006/table">
@@ -5300,28 +5332,28 @@
                 <a:gridCol w="2743200">
                   <a:extLst>
                     <a:ext uri="{9D8B030D-6E8A-4147-A177-3AD203B41FA5}">
-                      <a16:colId xmlns="" xmlns:a16="http://schemas.microsoft.com/office/drawing/2014/main" val="4007007747"/>
+                      <a16:colId xmlns:a16="http://schemas.microsoft.com/office/drawing/2014/main" xmlns="" val="4007007747"/>
                     </a:ext>
                   </a:extLst>
                 </a:gridCol>
                 <a:gridCol w="2743200">
                   <a:extLst>
                     <a:ext uri="{9D8B030D-6E8A-4147-A177-3AD203B41FA5}">
-                      <a16:colId xmlns="" xmlns:a16="http://schemas.microsoft.com/office/drawing/2014/main" val="2089765381"/>
+                      <a16:colId xmlns:a16="http://schemas.microsoft.com/office/drawing/2014/main" xmlns="" val="2089765381"/>
                     </a:ext>
                   </a:extLst>
                 </a:gridCol>
                 <a:gridCol w="2743200">
                   <a:extLst>
                     <a:ext uri="{9D8B030D-6E8A-4147-A177-3AD203B41FA5}">
-                      <a16:colId xmlns="" xmlns:a16="http://schemas.microsoft.com/office/drawing/2014/main" val="2946535250"/>
+                      <a16:colId xmlns:a16="http://schemas.microsoft.com/office/drawing/2014/main" xmlns="" val="2946535250"/>
                     </a:ext>
                   </a:extLst>
                 </a:gridCol>
                 <a:gridCol w="2743200">
                   <a:extLst>
                     <a:ext uri="{9D8B030D-6E8A-4147-A177-3AD203B41FA5}">
-                      <a16:colId xmlns="" xmlns:a16="http://schemas.microsoft.com/office/drawing/2014/main" val="2232881725"/>
+                      <a16:colId xmlns:a16="http://schemas.microsoft.com/office/drawing/2014/main" xmlns="" val="2232881725"/>
                     </a:ext>
                   </a:extLst>
                 </a:gridCol>
@@ -5385,7 +5417,7 @@
                 </a:tc>
                 <a:extLst>
                   <a:ext uri="{0D108BD9-81ED-4DB2-BD59-A6C34878D82A}">
-                    <a16:rowId xmlns="" xmlns:a16="http://schemas.microsoft.com/office/drawing/2014/main" val="2585052838"/>
+                    <a16:rowId xmlns:a16="http://schemas.microsoft.com/office/drawing/2014/main" xmlns="" val="2585052838"/>
                   </a:ext>
                 </a:extLst>
               </a:tr>
@@ -5452,7 +5484,7 @@
                 </a:tc>
                 <a:extLst>
                   <a:ext uri="{0D108BD9-81ED-4DB2-BD59-A6C34878D82A}">
-                    <a16:rowId xmlns="" xmlns:a16="http://schemas.microsoft.com/office/drawing/2014/main" val="2319653860"/>
+                    <a16:rowId xmlns:a16="http://schemas.microsoft.com/office/drawing/2014/main" xmlns="" val="2319653860"/>
                   </a:ext>
                 </a:extLst>
               </a:tr>
@@ -5513,7 +5545,7 @@
                 </a:tc>
                 <a:extLst>
                   <a:ext uri="{0D108BD9-81ED-4DB2-BD59-A6C34878D82A}">
-                    <a16:rowId xmlns="" xmlns:a16="http://schemas.microsoft.com/office/drawing/2014/main" val="2490656911"/>
+                    <a16:rowId xmlns:a16="http://schemas.microsoft.com/office/drawing/2014/main" xmlns="" val="2490656911"/>
                   </a:ext>
                 </a:extLst>
               </a:tr>
@@ -5580,7 +5612,7 @@
                 </a:tc>
                 <a:extLst>
                   <a:ext uri="{0D108BD9-81ED-4DB2-BD59-A6C34878D82A}">
-                    <a16:rowId xmlns="" xmlns:a16="http://schemas.microsoft.com/office/drawing/2014/main" val="281916472"/>
+                    <a16:rowId xmlns:a16="http://schemas.microsoft.com/office/drawing/2014/main" xmlns="" val="281916472"/>
                   </a:ext>
                 </a:extLst>
               </a:tr>
@@ -5703,7 +5735,7 @@
   <p:timing>
     <p:tnLst>
       <p:par>
-        <p:cTn xmlns:p14="http://schemas.microsoft.com/office/powerpoint/2010/main" id="1" dur="indefinite" restart="never" nodeType="tmRoot"/>
+        <p:cTn id="1" dur="indefinite" restart="never" nodeType="tmRoot"/>
       </p:par>
     </p:tnLst>
   </p:timing>
@@ -5778,28 +5810,28 @@
                 <a:gridCol w="2743200">
                   <a:extLst>
                     <a:ext uri="{9D8B030D-6E8A-4147-A177-3AD203B41FA5}">
-                      <a16:colId xmlns="" xmlns:a16="http://schemas.microsoft.com/office/drawing/2014/main" val="4007007747"/>
+                      <a16:colId xmlns:a16="http://schemas.microsoft.com/office/drawing/2014/main" xmlns="" val="4007007747"/>
                     </a:ext>
                   </a:extLst>
                 </a:gridCol>
                 <a:gridCol w="2743200">
                   <a:extLst>
                     <a:ext uri="{9D8B030D-6E8A-4147-A177-3AD203B41FA5}">
-                      <a16:colId xmlns="" xmlns:a16="http://schemas.microsoft.com/office/drawing/2014/main" val="2089765381"/>
+                      <a16:colId xmlns:a16="http://schemas.microsoft.com/office/drawing/2014/main" xmlns="" val="2089765381"/>
                     </a:ext>
                   </a:extLst>
                 </a:gridCol>
                 <a:gridCol w="2743200">
                   <a:extLst>
                     <a:ext uri="{9D8B030D-6E8A-4147-A177-3AD203B41FA5}">
-                      <a16:colId xmlns="" xmlns:a16="http://schemas.microsoft.com/office/drawing/2014/main" val="2946535250"/>
+                      <a16:colId xmlns:a16="http://schemas.microsoft.com/office/drawing/2014/main" xmlns="" val="2946535250"/>
                     </a:ext>
                   </a:extLst>
                 </a:gridCol>
                 <a:gridCol w="2743200">
                   <a:extLst>
                     <a:ext uri="{9D8B030D-6E8A-4147-A177-3AD203B41FA5}">
-                      <a16:colId xmlns="" xmlns:a16="http://schemas.microsoft.com/office/drawing/2014/main" val="2232881725"/>
+                      <a16:colId xmlns:a16="http://schemas.microsoft.com/office/drawing/2014/main" xmlns="" val="2232881725"/>
                     </a:ext>
                   </a:extLst>
                 </a:gridCol>
@@ -5863,7 +5895,7 @@
                 </a:tc>
                 <a:extLst>
                   <a:ext uri="{0D108BD9-81ED-4DB2-BD59-A6C34878D82A}">
-                    <a16:rowId xmlns="" xmlns:a16="http://schemas.microsoft.com/office/drawing/2014/main" val="2585052838"/>
+                    <a16:rowId xmlns:a16="http://schemas.microsoft.com/office/drawing/2014/main" xmlns="" val="2585052838"/>
                   </a:ext>
                 </a:extLst>
               </a:tr>
@@ -5930,7 +5962,7 @@
                 </a:tc>
                 <a:extLst>
                   <a:ext uri="{0D108BD9-81ED-4DB2-BD59-A6C34878D82A}">
-                    <a16:rowId xmlns="" xmlns:a16="http://schemas.microsoft.com/office/drawing/2014/main" val="3764811118"/>
+                    <a16:rowId xmlns:a16="http://schemas.microsoft.com/office/drawing/2014/main" xmlns="" val="3764811118"/>
                   </a:ext>
                 </a:extLst>
               </a:tr>
@@ -5997,7 +6029,7 @@
                 </a:tc>
                 <a:extLst>
                   <a:ext uri="{0D108BD9-81ED-4DB2-BD59-A6C34878D82A}">
-                    <a16:rowId xmlns="" xmlns:a16="http://schemas.microsoft.com/office/drawing/2014/main" val="14760046"/>
+                    <a16:rowId xmlns:a16="http://schemas.microsoft.com/office/drawing/2014/main" xmlns="" val="14760046"/>
                   </a:ext>
                 </a:extLst>
               </a:tr>
@@ -6064,7 +6096,7 @@
                 </a:tc>
                 <a:extLst>
                   <a:ext uri="{0D108BD9-81ED-4DB2-BD59-A6C34878D82A}">
-                    <a16:rowId xmlns="" xmlns:a16="http://schemas.microsoft.com/office/drawing/2014/main" val="1188642816"/>
+                    <a16:rowId xmlns:a16="http://schemas.microsoft.com/office/drawing/2014/main" xmlns="" val="1188642816"/>
                   </a:ext>
                 </a:extLst>
               </a:tr>
@@ -6128,7 +6160,7 @@
                 </a:tc>
                 <a:extLst>
                   <a:ext uri="{0D108BD9-81ED-4DB2-BD59-A6C34878D82A}">
-                    <a16:rowId xmlns="" xmlns:a16="http://schemas.microsoft.com/office/drawing/2014/main" val="297767302"/>
+                    <a16:rowId xmlns:a16="http://schemas.microsoft.com/office/drawing/2014/main" xmlns="" val="297767302"/>
                   </a:ext>
                 </a:extLst>
               </a:tr>
@@ -6251,7 +6283,7 @@
   <p:timing>
     <p:tnLst>
       <p:par>
-        <p:cTn xmlns:p14="http://schemas.microsoft.com/office/powerpoint/2010/main" id="1" dur="indefinite" restart="never" nodeType="tmRoot"/>
+        <p:cTn id="1" dur="indefinite" restart="never" nodeType="tmRoot"/>
       </p:par>
     </p:tnLst>
   </p:timing>
@@ -6314,7 +6346,7 @@
         </p:nvGraphicFramePr>
         <p:xfrm>
           <a:off x="609600" y="1600200"/>
-          <a:ext cx="10972800" cy="4622799"/>
+          <a:ext cx="10972800" cy="4622800"/>
         </p:xfrm>
         <a:graphic>
           <a:graphicData uri="http://schemas.openxmlformats.org/drawingml/2006/table">
@@ -6326,28 +6358,28 @@
                 <a:gridCol w="2743200">
                   <a:extLst>
                     <a:ext uri="{9D8B030D-6E8A-4147-A177-3AD203B41FA5}">
-                      <a16:colId xmlns="" xmlns:a16="http://schemas.microsoft.com/office/drawing/2014/main" val="4007007747"/>
+                      <a16:colId xmlns:a16="http://schemas.microsoft.com/office/drawing/2014/main" xmlns="" val="4007007747"/>
                     </a:ext>
                   </a:extLst>
                 </a:gridCol>
                 <a:gridCol w="2743200">
                   <a:extLst>
                     <a:ext uri="{9D8B030D-6E8A-4147-A177-3AD203B41FA5}">
-                      <a16:colId xmlns="" xmlns:a16="http://schemas.microsoft.com/office/drawing/2014/main" val="2089765381"/>
+                      <a16:colId xmlns:a16="http://schemas.microsoft.com/office/drawing/2014/main" xmlns="" val="2089765381"/>
                     </a:ext>
                   </a:extLst>
                 </a:gridCol>
                 <a:gridCol w="2743200">
                   <a:extLst>
                     <a:ext uri="{9D8B030D-6E8A-4147-A177-3AD203B41FA5}">
-                      <a16:colId xmlns="" xmlns:a16="http://schemas.microsoft.com/office/drawing/2014/main" val="2946535250"/>
+                      <a16:colId xmlns:a16="http://schemas.microsoft.com/office/drawing/2014/main" xmlns="" val="2946535250"/>
                     </a:ext>
                   </a:extLst>
                 </a:gridCol>
                 <a:gridCol w="2743200">
                   <a:extLst>
                     <a:ext uri="{9D8B030D-6E8A-4147-A177-3AD203B41FA5}">
-                      <a16:colId xmlns="" xmlns:a16="http://schemas.microsoft.com/office/drawing/2014/main" val="2232881725"/>
+                      <a16:colId xmlns:a16="http://schemas.microsoft.com/office/drawing/2014/main" xmlns="" val="2232881725"/>
                     </a:ext>
                   </a:extLst>
                 </a:gridCol>
@@ -6411,7 +6443,7 @@
                 </a:tc>
                 <a:extLst>
                   <a:ext uri="{0D108BD9-81ED-4DB2-BD59-A6C34878D82A}">
-                    <a16:rowId xmlns="" xmlns:a16="http://schemas.microsoft.com/office/drawing/2014/main" val="2585052838"/>
+                    <a16:rowId xmlns:a16="http://schemas.microsoft.com/office/drawing/2014/main" xmlns="" val="2585052838"/>
                   </a:ext>
                 </a:extLst>
               </a:tr>
@@ -6472,7 +6504,7 @@
                 </a:tc>
                 <a:extLst>
                   <a:ext uri="{0D108BD9-81ED-4DB2-BD59-A6C34878D82A}">
-                    <a16:rowId xmlns="" xmlns:a16="http://schemas.microsoft.com/office/drawing/2014/main" val="3714616697"/>
+                    <a16:rowId xmlns:a16="http://schemas.microsoft.com/office/drawing/2014/main" xmlns="" val="3714616697"/>
                   </a:ext>
                 </a:extLst>
               </a:tr>
@@ -6539,7 +6571,7 @@
                 </a:tc>
                 <a:extLst>
                   <a:ext uri="{0D108BD9-81ED-4DB2-BD59-A6C34878D82A}">
-                    <a16:rowId xmlns="" xmlns:a16="http://schemas.microsoft.com/office/drawing/2014/main" val="1340422060"/>
+                    <a16:rowId xmlns:a16="http://schemas.microsoft.com/office/drawing/2014/main" xmlns="" val="1340422060"/>
                   </a:ext>
                 </a:extLst>
               </a:tr>
@@ -6606,7 +6638,7 @@
                 </a:tc>
                 <a:extLst>
                   <a:ext uri="{0D108BD9-81ED-4DB2-BD59-A6C34878D82A}">
-                    <a16:rowId xmlns="" xmlns:a16="http://schemas.microsoft.com/office/drawing/2014/main" val="2564084175"/>
+                    <a16:rowId xmlns:a16="http://schemas.microsoft.com/office/drawing/2014/main" xmlns="" val="2564084175"/>
                   </a:ext>
                 </a:extLst>
               </a:tr>
@@ -6673,7 +6705,7 @@
                 </a:tc>
                 <a:extLst>
                   <a:ext uri="{0D108BD9-81ED-4DB2-BD59-A6C34878D82A}">
-                    <a16:rowId xmlns="" xmlns:a16="http://schemas.microsoft.com/office/drawing/2014/main" val="2775949887"/>
+                    <a16:rowId xmlns:a16="http://schemas.microsoft.com/office/drawing/2014/main" xmlns="" val="2775949887"/>
                   </a:ext>
                 </a:extLst>
               </a:tr>
@@ -6737,7 +6769,7 @@
                 </a:tc>
                 <a:extLst>
                   <a:ext uri="{0D108BD9-81ED-4DB2-BD59-A6C34878D82A}">
-                    <a16:rowId xmlns="" xmlns:a16="http://schemas.microsoft.com/office/drawing/2014/main" val="2549268092"/>
+                    <a16:rowId xmlns:a16="http://schemas.microsoft.com/office/drawing/2014/main" xmlns="" val="2549268092"/>
                   </a:ext>
                 </a:extLst>
               </a:tr>
@@ -6801,7 +6833,7 @@
                 </a:tc>
                 <a:extLst>
                   <a:ext uri="{0D108BD9-81ED-4DB2-BD59-A6C34878D82A}">
-                    <a16:rowId xmlns="" xmlns:a16="http://schemas.microsoft.com/office/drawing/2014/main" val="178318549"/>
+                    <a16:rowId xmlns:a16="http://schemas.microsoft.com/office/drawing/2014/main" xmlns="" val="178318549"/>
                   </a:ext>
                 </a:extLst>
               </a:tr>
@@ -6924,7 +6956,7 @@
   <p:timing>
     <p:tnLst>
       <p:par>
-        <p:cTn xmlns:p14="http://schemas.microsoft.com/office/powerpoint/2010/main" id="1" dur="indefinite" restart="never" nodeType="tmRoot"/>
+        <p:cTn id="1" dur="indefinite" restart="never" nodeType="tmRoot"/>
       </p:par>
     </p:tnLst>
   </p:timing>
@@ -7212,7 +7244,7 @@
   <p:timing>
     <p:tnLst>
       <p:par>
-        <p:cTn xmlns:p14="http://schemas.microsoft.com/office/powerpoint/2010/main" id="1" dur="indefinite" restart="never" nodeType="tmRoot"/>
+        <p:cTn id="1" dur="indefinite" restart="never" nodeType="tmRoot"/>
       </p:par>
     </p:tnLst>
   </p:timing>
@@ -7291,7 +7323,7 @@
           <a:noFill/>
           <a:extLst>
             <a:ext uri="{909E8E84-426E-40dd-AFC4-6F175D3DCCD1}">
-              <a14:hiddenFill xmlns:a14="http://schemas.microsoft.com/office/drawing/2010/main">
+              <a14:hiddenFill xmlns:a14="http://schemas.microsoft.com/office/drawing/2010/main" xmlns="">
                 <a:solidFill>
                   <a:srgbClr val="FFFFFF"/>
                 </a:solidFill>
@@ -7415,7 +7447,7 @@
   <p:timing>
     <p:tnLst>
       <p:par>
-        <p:cTn xmlns:p14="http://schemas.microsoft.com/office/powerpoint/2010/main" id="1" dur="indefinite" restart="never" nodeType="tmRoot"/>
+        <p:cTn id="1" dur="indefinite" restart="never" nodeType="tmRoot"/>
       </p:par>
     </p:tnLst>
   </p:timing>
@@ -7479,8 +7511,13 @@
           <a:p>
             <a:r>
               <a:rPr lang="en-US" dirty="0" smtClean="0"/>
-              <a:t>Penetration attacks</a:t>
-            </a:r>
+              <a:t>Penetration </a:t>
+            </a:r>
+            <a:r>
+              <a:rPr lang="en-US" dirty="0" smtClean="0"/>
+              <a:t>Attacks</a:t>
+            </a:r>
+            <a:endParaRPr lang="en-US" dirty="0" smtClean="0"/>
           </a:p>
           <a:p>
             <a:pPr lvl="1"/>
@@ -7492,21 +7529,24 @@
           <a:p>
             <a:r>
               <a:rPr lang="en-US" dirty="0" smtClean="0"/>
-              <a:t>Man in the middle attack</a:t>
-            </a:r>
+              <a:t>MITM Attack</a:t>
+            </a:r>
+            <a:endParaRPr lang="en-US" dirty="0" smtClean="0"/>
           </a:p>
           <a:p>
             <a:r>
               <a:rPr lang="en-US" dirty="0" smtClean="0"/>
-              <a:t>SQL injection</a:t>
-            </a:r>
-          </a:p>
-          <a:p>
+              <a:t>SQL </a:t>
+            </a:r>
+            <a:r>
+              <a:rPr lang="en-US" dirty="0"/>
+              <a:t>I</a:t>
+            </a:r>
             <a:r>
               <a:rPr lang="en-US" dirty="0" smtClean="0"/>
-              <a:t>Penetration attacks</a:t>
-            </a:r>
-            <a:endParaRPr lang="en-US" dirty="0"/>
+              <a:t>njection</a:t>
+            </a:r>
+            <a:endParaRPr lang="en-US" dirty="0" smtClean="0"/>
           </a:p>
         </p:txBody>
       </p:sp>
@@ -7690,7 +7730,7 @@
         </p:nvGraphicFramePr>
         <p:xfrm>
           <a:off x="609600" y="1600200"/>
-          <a:ext cx="10972800" cy="2565399"/>
+          <a:ext cx="10972800" cy="2565400"/>
         </p:xfrm>
         <a:graphic>
           <a:graphicData uri="http://schemas.openxmlformats.org/drawingml/2006/table">
@@ -8268,7 +8308,7 @@
   <p:timing>
     <p:tnLst>
       <p:par>
-        <p:cTn xmlns:p14="http://schemas.microsoft.com/office/powerpoint/2010/main" id="1" dur="indefinite" restart="never" nodeType="tmRoot"/>
+        <p:cTn id="1" dur="indefinite" restart="never" nodeType="tmRoot"/>
       </p:par>
     </p:tnLst>
   </p:timing>
@@ -8352,7 +8392,7 @@
           <a:noFill/>
           <a:extLst>
             <a:ext uri="{909E8E84-426E-40dd-AFC4-6F175D3DCCD1}">
-              <a14:hiddenFill xmlns:a14="http://schemas.microsoft.com/office/drawing/2010/main">
+              <a14:hiddenFill xmlns:a14="http://schemas.microsoft.com/office/drawing/2010/main" xmlns="">
                 <a:solidFill>
                   <a:srgbClr val="FFFFFF"/>
                 </a:solidFill>
@@ -8476,7 +8516,7 @@
   <p:timing>
     <p:tnLst>
       <p:par>
-        <p:cTn xmlns:p14="http://schemas.microsoft.com/office/powerpoint/2010/main" id="1" dur="indefinite" restart="never" nodeType="tmRoot"/>
+        <p:cTn id="1" dur="indefinite" restart="never" nodeType="tmRoot"/>
       </p:par>
     </p:tnLst>
   </p:timing>
@@ -8552,14 +8592,14 @@
                 <a:gridCol w="5486400">
                   <a:extLst>
                     <a:ext uri="{9D8B030D-6E8A-4147-A177-3AD203B41FA5}">
-                      <a16:colId xmlns="" xmlns:a16="http://schemas.microsoft.com/office/drawing/2014/main" val="4024214062"/>
+                      <a16:colId xmlns:a16="http://schemas.microsoft.com/office/drawing/2014/main" xmlns="" val="4024214062"/>
                     </a:ext>
                   </a:extLst>
                 </a:gridCol>
                 <a:gridCol w="5486400">
                   <a:extLst>
                     <a:ext uri="{9D8B030D-6E8A-4147-A177-3AD203B41FA5}">
-                      <a16:colId xmlns="" xmlns:a16="http://schemas.microsoft.com/office/drawing/2014/main" val="1838665537"/>
+                      <a16:colId xmlns:a16="http://schemas.microsoft.com/office/drawing/2014/main" xmlns="" val="1838665537"/>
                     </a:ext>
                   </a:extLst>
                 </a:gridCol>
@@ -8595,7 +8635,7 @@
                 </a:tc>
                 <a:extLst>
                   <a:ext uri="{0D108BD9-81ED-4DB2-BD59-A6C34878D82A}">
-                    <a16:rowId xmlns="" xmlns:a16="http://schemas.microsoft.com/office/drawing/2014/main" val="986279335"/>
+                    <a16:rowId xmlns:a16="http://schemas.microsoft.com/office/drawing/2014/main" xmlns="" val="986279335"/>
                   </a:ext>
                 </a:extLst>
               </a:tr>
@@ -8626,7 +8666,7 @@
                 </a:tc>
                 <a:extLst>
                   <a:ext uri="{0D108BD9-81ED-4DB2-BD59-A6C34878D82A}">
-                    <a16:rowId xmlns="" xmlns:a16="http://schemas.microsoft.com/office/drawing/2014/main" val="2649700066"/>
+                    <a16:rowId xmlns:a16="http://schemas.microsoft.com/office/drawing/2014/main" xmlns="" val="2649700066"/>
                   </a:ext>
                 </a:extLst>
               </a:tr>
@@ -8661,7 +8701,7 @@
                 </a:tc>
                 <a:extLst>
                   <a:ext uri="{0D108BD9-81ED-4DB2-BD59-A6C34878D82A}">
-                    <a16:rowId xmlns="" xmlns:a16="http://schemas.microsoft.com/office/drawing/2014/main" val="3650691391"/>
+                    <a16:rowId xmlns:a16="http://schemas.microsoft.com/office/drawing/2014/main" xmlns="" val="3650691391"/>
                   </a:ext>
                 </a:extLst>
               </a:tr>
@@ -8696,7 +8736,7 @@
                 </a:tc>
                 <a:extLst>
                   <a:ext uri="{0D108BD9-81ED-4DB2-BD59-A6C34878D82A}">
-                    <a16:rowId xmlns="" xmlns:a16="http://schemas.microsoft.com/office/drawing/2014/main" val="3717878835"/>
+                    <a16:rowId xmlns:a16="http://schemas.microsoft.com/office/drawing/2014/main" xmlns="" val="3717878835"/>
                   </a:ext>
                 </a:extLst>
               </a:tr>
@@ -8731,7 +8771,7 @@
                 </a:tc>
                 <a:extLst>
                   <a:ext uri="{0D108BD9-81ED-4DB2-BD59-A6C34878D82A}">
-                    <a16:rowId xmlns="" xmlns:a16="http://schemas.microsoft.com/office/drawing/2014/main" val="304909867"/>
+                    <a16:rowId xmlns:a16="http://schemas.microsoft.com/office/drawing/2014/main" xmlns="" val="304909867"/>
                   </a:ext>
                 </a:extLst>
               </a:tr>
@@ -8770,7 +8810,7 @@
                 </a:tc>
                 <a:extLst>
                   <a:ext uri="{0D108BD9-81ED-4DB2-BD59-A6C34878D82A}">
-                    <a16:rowId xmlns="" xmlns:a16="http://schemas.microsoft.com/office/drawing/2014/main" val="1562380615"/>
+                    <a16:rowId xmlns:a16="http://schemas.microsoft.com/office/drawing/2014/main" xmlns="" val="1562380615"/>
                   </a:ext>
                 </a:extLst>
               </a:tr>
@@ -8805,7 +8845,7 @@
                 </a:tc>
                 <a:extLst>
                   <a:ext uri="{0D108BD9-81ED-4DB2-BD59-A6C34878D82A}">
-                    <a16:rowId xmlns="" xmlns:a16="http://schemas.microsoft.com/office/drawing/2014/main" val="207666318"/>
+                    <a16:rowId xmlns:a16="http://schemas.microsoft.com/office/drawing/2014/main" xmlns="" val="207666318"/>
                   </a:ext>
                 </a:extLst>
               </a:tr>
@@ -8840,7 +8880,7 @@
                 </a:tc>
                 <a:extLst>
                   <a:ext uri="{0D108BD9-81ED-4DB2-BD59-A6C34878D82A}">
-                    <a16:rowId xmlns="" xmlns:a16="http://schemas.microsoft.com/office/drawing/2014/main" val="4219954106"/>
+                    <a16:rowId xmlns:a16="http://schemas.microsoft.com/office/drawing/2014/main" xmlns="" val="4219954106"/>
                   </a:ext>
                 </a:extLst>
               </a:tr>
@@ -8875,7 +8915,7 @@
                 </a:tc>
                 <a:extLst>
                   <a:ext uri="{0D108BD9-81ED-4DB2-BD59-A6C34878D82A}">
-                    <a16:rowId xmlns="" xmlns:a16="http://schemas.microsoft.com/office/drawing/2014/main" val="2908311740"/>
+                    <a16:rowId xmlns:a16="http://schemas.microsoft.com/office/drawing/2014/main" xmlns="" val="2908311740"/>
                   </a:ext>
                 </a:extLst>
               </a:tr>
@@ -8909,7 +8949,7 @@
                 </a:tc>
                 <a:extLst>
                   <a:ext uri="{0D108BD9-81ED-4DB2-BD59-A6C34878D82A}">
-                    <a16:rowId xmlns="" xmlns:a16="http://schemas.microsoft.com/office/drawing/2014/main" val="2041197959"/>
+                    <a16:rowId xmlns:a16="http://schemas.microsoft.com/office/drawing/2014/main" xmlns="" val="2041197959"/>
                   </a:ext>
                 </a:extLst>
               </a:tr>
@@ -8943,7 +8983,7 @@
                 </a:tc>
                 <a:extLst>
                   <a:ext uri="{0D108BD9-81ED-4DB2-BD59-A6C34878D82A}">
-                    <a16:rowId xmlns="" xmlns:a16="http://schemas.microsoft.com/office/drawing/2014/main" val="1620820458"/>
+                    <a16:rowId xmlns:a16="http://schemas.microsoft.com/office/drawing/2014/main" xmlns="" val="1620820458"/>
                   </a:ext>
                 </a:extLst>
               </a:tr>
@@ -9066,7 +9106,7 @@
   <p:timing>
     <p:tnLst>
       <p:par>
-        <p:cTn xmlns:p14="http://schemas.microsoft.com/office/powerpoint/2010/main" id="1" dur="indefinite" restart="never" nodeType="tmRoot"/>
+        <p:cTn id="1" dur="indefinite" restart="never" nodeType="tmRoot"/>
       </p:par>
     </p:tnLst>
   </p:timing>
@@ -9142,14 +9182,14 @@
                 <a:gridCol w="5486400">
                   <a:extLst>
                     <a:ext uri="{9D8B030D-6E8A-4147-A177-3AD203B41FA5}">
-                      <a16:colId xmlns="" xmlns:a16="http://schemas.microsoft.com/office/drawing/2014/main" val="4024214062"/>
+                      <a16:colId xmlns:a16="http://schemas.microsoft.com/office/drawing/2014/main" xmlns="" val="4024214062"/>
                     </a:ext>
                   </a:extLst>
                 </a:gridCol>
                 <a:gridCol w="5486400">
                   <a:extLst>
                     <a:ext uri="{9D8B030D-6E8A-4147-A177-3AD203B41FA5}">
-                      <a16:colId xmlns="" xmlns:a16="http://schemas.microsoft.com/office/drawing/2014/main" val="1838665537"/>
+                      <a16:colId xmlns:a16="http://schemas.microsoft.com/office/drawing/2014/main" xmlns="" val="1838665537"/>
                     </a:ext>
                   </a:extLst>
                 </a:gridCol>
@@ -9181,7 +9221,7 @@
                 </a:tc>
                 <a:extLst>
                   <a:ext uri="{0D108BD9-81ED-4DB2-BD59-A6C34878D82A}">
-                    <a16:rowId xmlns="" xmlns:a16="http://schemas.microsoft.com/office/drawing/2014/main" val="986279335"/>
+                    <a16:rowId xmlns:a16="http://schemas.microsoft.com/office/drawing/2014/main" xmlns="" val="986279335"/>
                   </a:ext>
                 </a:extLst>
               </a:tr>
@@ -9212,7 +9252,7 @@
                 </a:tc>
                 <a:extLst>
                   <a:ext uri="{0D108BD9-81ED-4DB2-BD59-A6C34878D82A}">
-                    <a16:rowId xmlns="" xmlns:a16="http://schemas.microsoft.com/office/drawing/2014/main" val="2649700066"/>
+                    <a16:rowId xmlns:a16="http://schemas.microsoft.com/office/drawing/2014/main" xmlns="" val="2649700066"/>
                   </a:ext>
                 </a:extLst>
               </a:tr>
@@ -9247,7 +9287,7 @@
                 </a:tc>
                 <a:extLst>
                   <a:ext uri="{0D108BD9-81ED-4DB2-BD59-A6C34878D82A}">
-                    <a16:rowId xmlns="" xmlns:a16="http://schemas.microsoft.com/office/drawing/2014/main" val="309961168"/>
+                    <a16:rowId xmlns:a16="http://schemas.microsoft.com/office/drawing/2014/main" xmlns="" val="309961168"/>
                   </a:ext>
                 </a:extLst>
               </a:tr>
@@ -9282,7 +9322,7 @@
                 </a:tc>
                 <a:extLst>
                   <a:ext uri="{0D108BD9-81ED-4DB2-BD59-A6C34878D82A}">
-                    <a16:rowId xmlns="" xmlns:a16="http://schemas.microsoft.com/office/drawing/2014/main" val="1746750848"/>
+                    <a16:rowId xmlns:a16="http://schemas.microsoft.com/office/drawing/2014/main" xmlns="" val="1746750848"/>
                   </a:ext>
                 </a:extLst>
               </a:tr>
@@ -9317,7 +9357,7 @@
                 </a:tc>
                 <a:extLst>
                   <a:ext uri="{0D108BD9-81ED-4DB2-BD59-A6C34878D82A}">
-                    <a16:rowId xmlns="" xmlns:a16="http://schemas.microsoft.com/office/drawing/2014/main" val="2287252683"/>
+                    <a16:rowId xmlns:a16="http://schemas.microsoft.com/office/drawing/2014/main" xmlns="" val="2287252683"/>
                   </a:ext>
                 </a:extLst>
               </a:tr>
@@ -9352,7 +9392,7 @@
                 </a:tc>
                 <a:extLst>
                   <a:ext uri="{0D108BD9-81ED-4DB2-BD59-A6C34878D82A}">
-                    <a16:rowId xmlns="" xmlns:a16="http://schemas.microsoft.com/office/drawing/2014/main" val="3931255069"/>
+                    <a16:rowId xmlns:a16="http://schemas.microsoft.com/office/drawing/2014/main" xmlns="" val="3931255069"/>
                   </a:ext>
                 </a:extLst>
               </a:tr>
@@ -9387,7 +9427,7 @@
                 </a:tc>
                 <a:extLst>
                   <a:ext uri="{0D108BD9-81ED-4DB2-BD59-A6C34878D82A}">
-                    <a16:rowId xmlns="" xmlns:a16="http://schemas.microsoft.com/office/drawing/2014/main" val="3016523529"/>
+                    <a16:rowId xmlns:a16="http://schemas.microsoft.com/office/drawing/2014/main" xmlns="" val="3016523529"/>
                   </a:ext>
                 </a:extLst>
               </a:tr>
@@ -9422,7 +9462,7 @@
                 </a:tc>
                 <a:extLst>
                   <a:ext uri="{0D108BD9-81ED-4DB2-BD59-A6C34878D82A}">
-                    <a16:rowId xmlns="" xmlns:a16="http://schemas.microsoft.com/office/drawing/2014/main" val="3948036698"/>
+                    <a16:rowId xmlns:a16="http://schemas.microsoft.com/office/drawing/2014/main" xmlns="" val="3948036698"/>
                   </a:ext>
                 </a:extLst>
               </a:tr>
@@ -9457,7 +9497,7 @@
                 </a:tc>
                 <a:extLst>
                   <a:ext uri="{0D108BD9-81ED-4DB2-BD59-A6C34878D82A}">
-                    <a16:rowId xmlns="" xmlns:a16="http://schemas.microsoft.com/office/drawing/2014/main" val="1862235874"/>
+                    <a16:rowId xmlns:a16="http://schemas.microsoft.com/office/drawing/2014/main" xmlns="" val="1862235874"/>
                   </a:ext>
                 </a:extLst>
               </a:tr>
@@ -9492,7 +9532,7 @@
                 </a:tc>
                 <a:extLst>
                   <a:ext uri="{0D108BD9-81ED-4DB2-BD59-A6C34878D82A}">
-                    <a16:rowId xmlns="" xmlns:a16="http://schemas.microsoft.com/office/drawing/2014/main" val="1952473074"/>
+                    <a16:rowId xmlns:a16="http://schemas.microsoft.com/office/drawing/2014/main" xmlns="" val="1952473074"/>
                   </a:ext>
                 </a:extLst>
               </a:tr>
@@ -9527,7 +9567,7 @@
                 </a:tc>
                 <a:extLst>
                   <a:ext uri="{0D108BD9-81ED-4DB2-BD59-A6C34878D82A}">
-                    <a16:rowId xmlns="" xmlns:a16="http://schemas.microsoft.com/office/drawing/2014/main" val="3794391533"/>
+                    <a16:rowId xmlns:a16="http://schemas.microsoft.com/office/drawing/2014/main" xmlns="" val="3794391533"/>
                   </a:ext>
                 </a:extLst>
               </a:tr>
@@ -9562,7 +9602,7 @@
                 </a:tc>
                 <a:extLst>
                   <a:ext uri="{0D108BD9-81ED-4DB2-BD59-A6C34878D82A}">
-                    <a16:rowId xmlns="" xmlns:a16="http://schemas.microsoft.com/office/drawing/2014/main" val="4213279396"/>
+                    <a16:rowId xmlns:a16="http://schemas.microsoft.com/office/drawing/2014/main" xmlns="" val="4213279396"/>
                   </a:ext>
                 </a:extLst>
               </a:tr>
@@ -9685,7 +9725,7 @@
   <p:timing>
     <p:tnLst>
       <p:par>
-        <p:cTn xmlns:p14="http://schemas.microsoft.com/office/powerpoint/2010/main" id="1" dur="indefinite" restart="never" nodeType="tmRoot"/>
+        <p:cTn id="1" dur="indefinite" restart="never" nodeType="tmRoot"/>
       </p:par>
     </p:tnLst>
   </p:timing>
@@ -9761,14 +9801,14 @@
                 <a:gridCol w="5486400">
                   <a:extLst>
                     <a:ext uri="{9D8B030D-6E8A-4147-A177-3AD203B41FA5}">
-                      <a16:colId xmlns="" xmlns:a16="http://schemas.microsoft.com/office/drawing/2014/main" val="3661438328"/>
+                      <a16:colId xmlns:a16="http://schemas.microsoft.com/office/drawing/2014/main" xmlns="" val="3661438328"/>
                     </a:ext>
                   </a:extLst>
                 </a:gridCol>
                 <a:gridCol w="5486400">
                   <a:extLst>
                     <a:ext uri="{9D8B030D-6E8A-4147-A177-3AD203B41FA5}">
-                      <a16:colId xmlns="" xmlns:a16="http://schemas.microsoft.com/office/drawing/2014/main" val="2462084561"/>
+                      <a16:colId xmlns:a16="http://schemas.microsoft.com/office/drawing/2014/main" xmlns="" val="2462084561"/>
                     </a:ext>
                   </a:extLst>
                 </a:gridCol>
@@ -9804,7 +9844,7 @@
                 </a:tc>
                 <a:extLst>
                   <a:ext uri="{0D108BD9-81ED-4DB2-BD59-A6C34878D82A}">
-                    <a16:rowId xmlns="" xmlns:a16="http://schemas.microsoft.com/office/drawing/2014/main" val="2830022487"/>
+                    <a16:rowId xmlns:a16="http://schemas.microsoft.com/office/drawing/2014/main" xmlns="" val="2830022487"/>
                   </a:ext>
                 </a:extLst>
               </a:tr>
@@ -9839,7 +9879,7 @@
                 </a:tc>
                 <a:extLst>
                   <a:ext uri="{0D108BD9-81ED-4DB2-BD59-A6C34878D82A}">
-                    <a16:rowId xmlns="" xmlns:a16="http://schemas.microsoft.com/office/drawing/2014/main" val="3462792300"/>
+                    <a16:rowId xmlns:a16="http://schemas.microsoft.com/office/drawing/2014/main" xmlns="" val="3462792300"/>
                   </a:ext>
                 </a:extLst>
               </a:tr>
@@ -9882,7 +9922,7 @@
                 </a:tc>
                 <a:extLst>
                   <a:ext uri="{0D108BD9-81ED-4DB2-BD59-A6C34878D82A}">
-                    <a16:rowId xmlns="" xmlns:a16="http://schemas.microsoft.com/office/drawing/2014/main" val="3061581558"/>
+                    <a16:rowId xmlns:a16="http://schemas.microsoft.com/office/drawing/2014/main" xmlns="" val="3061581558"/>
                   </a:ext>
                 </a:extLst>
               </a:tr>
@@ -9933,7 +9973,7 @@
                 </a:tc>
                 <a:extLst>
                   <a:ext uri="{0D108BD9-81ED-4DB2-BD59-A6C34878D82A}">
-                    <a16:rowId xmlns="" xmlns:a16="http://schemas.microsoft.com/office/drawing/2014/main" val="742086977"/>
+                    <a16:rowId xmlns:a16="http://schemas.microsoft.com/office/drawing/2014/main" xmlns="" val="742086977"/>
                   </a:ext>
                 </a:extLst>
               </a:tr>
@@ -9972,7 +10012,7 @@
                 </a:tc>
                 <a:extLst>
                   <a:ext uri="{0D108BD9-81ED-4DB2-BD59-A6C34878D82A}">
-                    <a16:rowId xmlns="" xmlns:a16="http://schemas.microsoft.com/office/drawing/2014/main" val="2361850435"/>
+                    <a16:rowId xmlns:a16="http://schemas.microsoft.com/office/drawing/2014/main" xmlns="" val="2361850435"/>
                   </a:ext>
                 </a:extLst>
               </a:tr>
@@ -10015,7 +10055,7 @@
                 </a:tc>
                 <a:extLst>
                   <a:ext uri="{0D108BD9-81ED-4DB2-BD59-A6C34878D82A}">
-                    <a16:rowId xmlns="" xmlns:a16="http://schemas.microsoft.com/office/drawing/2014/main" val="2876776749"/>
+                    <a16:rowId xmlns:a16="http://schemas.microsoft.com/office/drawing/2014/main" xmlns="" val="2876776749"/>
                   </a:ext>
                 </a:extLst>
               </a:tr>
@@ -10050,7 +10090,7 @@
                 </a:tc>
                 <a:extLst>
                   <a:ext uri="{0D108BD9-81ED-4DB2-BD59-A6C34878D82A}">
-                    <a16:rowId xmlns="" xmlns:a16="http://schemas.microsoft.com/office/drawing/2014/main" val="2847548840"/>
+                    <a16:rowId xmlns:a16="http://schemas.microsoft.com/office/drawing/2014/main" xmlns="" val="2847548840"/>
                   </a:ext>
                 </a:extLst>
               </a:tr>
@@ -10089,7 +10129,7 @@
                 </a:tc>
                 <a:extLst>
                   <a:ext uri="{0D108BD9-81ED-4DB2-BD59-A6C34878D82A}">
-                    <a16:rowId xmlns="" xmlns:a16="http://schemas.microsoft.com/office/drawing/2014/main" val="1662843150"/>
+                    <a16:rowId xmlns:a16="http://schemas.microsoft.com/office/drawing/2014/main" xmlns="" val="1662843150"/>
                   </a:ext>
                 </a:extLst>
               </a:tr>
@@ -10212,7 +10252,7 @@
   <p:timing>
     <p:tnLst>
       <p:par>
-        <p:cTn xmlns:p14="http://schemas.microsoft.com/office/powerpoint/2010/main" id="1" dur="indefinite" restart="never" nodeType="tmRoot"/>
+        <p:cTn id="1" dur="indefinite" restart="never" nodeType="tmRoot"/>
       </p:par>
     </p:tnLst>
   </p:timing>
@@ -10404,7 +10444,7 @@
   <p:timing>
     <p:tnLst>
       <p:par>
-        <p:cTn xmlns:p14="http://schemas.microsoft.com/office/powerpoint/2010/main" id="1" dur="indefinite" restart="never" nodeType="tmRoot"/>
+        <p:cTn id="1" dur="indefinite" restart="never" nodeType="tmRoot"/>
       </p:par>
     </p:tnLst>
   </p:timing>
@@ -10480,28 +10520,28 @@
                 <a:gridCol w="2743200">
                   <a:extLst>
                     <a:ext uri="{9D8B030D-6E8A-4147-A177-3AD203B41FA5}">
-                      <a16:colId xmlns="" xmlns:a16="http://schemas.microsoft.com/office/drawing/2014/main" val="4007007747"/>
+                      <a16:colId xmlns:a16="http://schemas.microsoft.com/office/drawing/2014/main" xmlns="" val="4007007747"/>
                     </a:ext>
                   </a:extLst>
                 </a:gridCol>
                 <a:gridCol w="2743200">
                   <a:extLst>
                     <a:ext uri="{9D8B030D-6E8A-4147-A177-3AD203B41FA5}">
-                      <a16:colId xmlns="" xmlns:a16="http://schemas.microsoft.com/office/drawing/2014/main" val="2089765381"/>
+                      <a16:colId xmlns:a16="http://schemas.microsoft.com/office/drawing/2014/main" xmlns="" val="2089765381"/>
                     </a:ext>
                   </a:extLst>
                 </a:gridCol>
                 <a:gridCol w="2743200">
                   <a:extLst>
                     <a:ext uri="{9D8B030D-6E8A-4147-A177-3AD203B41FA5}">
-                      <a16:colId xmlns="" xmlns:a16="http://schemas.microsoft.com/office/drawing/2014/main" val="2946535250"/>
+                      <a16:colId xmlns:a16="http://schemas.microsoft.com/office/drawing/2014/main" xmlns="" val="2946535250"/>
                     </a:ext>
                   </a:extLst>
                 </a:gridCol>
                 <a:gridCol w="2743200">
                   <a:extLst>
                     <a:ext uri="{9D8B030D-6E8A-4147-A177-3AD203B41FA5}">
-                      <a16:colId xmlns="" xmlns:a16="http://schemas.microsoft.com/office/drawing/2014/main" val="2232881725"/>
+                      <a16:colId xmlns:a16="http://schemas.microsoft.com/office/drawing/2014/main" xmlns="" val="2232881725"/>
                     </a:ext>
                   </a:extLst>
                 </a:gridCol>
@@ -10565,7 +10605,7 @@
                 </a:tc>
                 <a:extLst>
                   <a:ext uri="{0D108BD9-81ED-4DB2-BD59-A6C34878D82A}">
-                    <a16:rowId xmlns="" xmlns:a16="http://schemas.microsoft.com/office/drawing/2014/main" val="2585052838"/>
+                    <a16:rowId xmlns:a16="http://schemas.microsoft.com/office/drawing/2014/main" xmlns="" val="2585052838"/>
                   </a:ext>
                 </a:extLst>
               </a:tr>
@@ -10632,7 +10672,7 @@
                 </a:tc>
                 <a:extLst>
                   <a:ext uri="{0D108BD9-81ED-4DB2-BD59-A6C34878D82A}">
-                    <a16:rowId xmlns="" xmlns:a16="http://schemas.microsoft.com/office/drawing/2014/main" val="1152342311"/>
+                    <a16:rowId xmlns:a16="http://schemas.microsoft.com/office/drawing/2014/main" xmlns="" val="1152342311"/>
                   </a:ext>
                 </a:extLst>
               </a:tr>
@@ -10699,7 +10739,7 @@
                 </a:tc>
                 <a:extLst>
                   <a:ext uri="{0D108BD9-81ED-4DB2-BD59-A6C34878D82A}">
-                    <a16:rowId xmlns="" xmlns:a16="http://schemas.microsoft.com/office/drawing/2014/main" val="2957515265"/>
+                    <a16:rowId xmlns:a16="http://schemas.microsoft.com/office/drawing/2014/main" xmlns="" val="2957515265"/>
                   </a:ext>
                 </a:extLst>
               </a:tr>
@@ -10822,7 +10862,7 @@
   <p:timing>
     <p:tnLst>
       <p:par>
-        <p:cTn xmlns:p14="http://schemas.microsoft.com/office/powerpoint/2010/main" id="1" dur="indefinite" restart="never" nodeType="tmRoot"/>
+        <p:cTn id="1" dur="indefinite" restart="never" nodeType="tmRoot"/>
       </p:par>
     </p:tnLst>
   </p:timing>
@@ -10898,28 +10938,28 @@
                 <a:gridCol w="2743200">
                   <a:extLst>
                     <a:ext uri="{9D8B030D-6E8A-4147-A177-3AD203B41FA5}">
-                      <a16:colId xmlns="" xmlns:a16="http://schemas.microsoft.com/office/drawing/2014/main" val="4007007747"/>
+                      <a16:colId xmlns:a16="http://schemas.microsoft.com/office/drawing/2014/main" xmlns="" val="4007007747"/>
                     </a:ext>
                   </a:extLst>
                 </a:gridCol>
                 <a:gridCol w="2743200">
                   <a:extLst>
                     <a:ext uri="{9D8B030D-6E8A-4147-A177-3AD203B41FA5}">
-                      <a16:colId xmlns="" xmlns:a16="http://schemas.microsoft.com/office/drawing/2014/main" val="2089765381"/>
+                      <a16:colId xmlns:a16="http://schemas.microsoft.com/office/drawing/2014/main" xmlns="" val="2089765381"/>
                     </a:ext>
                   </a:extLst>
                 </a:gridCol>
                 <a:gridCol w="2743200">
                   <a:extLst>
                     <a:ext uri="{9D8B030D-6E8A-4147-A177-3AD203B41FA5}">
-                      <a16:colId xmlns="" xmlns:a16="http://schemas.microsoft.com/office/drawing/2014/main" val="2946535250"/>
+                      <a16:colId xmlns:a16="http://schemas.microsoft.com/office/drawing/2014/main" xmlns="" val="2946535250"/>
                     </a:ext>
                   </a:extLst>
                 </a:gridCol>
                 <a:gridCol w="2743200">
                   <a:extLst>
                     <a:ext uri="{9D8B030D-6E8A-4147-A177-3AD203B41FA5}">
-                      <a16:colId xmlns="" xmlns:a16="http://schemas.microsoft.com/office/drawing/2014/main" val="2232881725"/>
+                      <a16:colId xmlns:a16="http://schemas.microsoft.com/office/drawing/2014/main" xmlns="" val="2232881725"/>
                     </a:ext>
                   </a:extLst>
                 </a:gridCol>
@@ -10983,7 +11023,7 @@
                 </a:tc>
                 <a:extLst>
                   <a:ext uri="{0D108BD9-81ED-4DB2-BD59-A6C34878D82A}">
-                    <a16:rowId xmlns="" xmlns:a16="http://schemas.microsoft.com/office/drawing/2014/main" val="2585052838"/>
+                    <a16:rowId xmlns:a16="http://schemas.microsoft.com/office/drawing/2014/main" xmlns="" val="2585052838"/>
                   </a:ext>
                 </a:extLst>
               </a:tr>
@@ -11050,7 +11090,7 @@
                 </a:tc>
                 <a:extLst>
                   <a:ext uri="{0D108BD9-81ED-4DB2-BD59-A6C34878D82A}">
-                    <a16:rowId xmlns="" xmlns:a16="http://schemas.microsoft.com/office/drawing/2014/main" val="3190619547"/>
+                    <a16:rowId xmlns:a16="http://schemas.microsoft.com/office/drawing/2014/main" xmlns="" val="3190619547"/>
                   </a:ext>
                 </a:extLst>
               </a:tr>
@@ -11111,7 +11151,7 @@
                 </a:tc>
                 <a:extLst>
                   <a:ext uri="{0D108BD9-81ED-4DB2-BD59-A6C34878D82A}">
-                    <a16:rowId xmlns="" xmlns:a16="http://schemas.microsoft.com/office/drawing/2014/main" val="1767920701"/>
+                    <a16:rowId xmlns:a16="http://schemas.microsoft.com/office/drawing/2014/main" xmlns="" val="1767920701"/>
                   </a:ext>
                 </a:extLst>
               </a:tr>
@@ -11178,7 +11218,7 @@
                 </a:tc>
                 <a:extLst>
                   <a:ext uri="{0D108BD9-81ED-4DB2-BD59-A6C34878D82A}">
-                    <a16:rowId xmlns="" xmlns:a16="http://schemas.microsoft.com/office/drawing/2014/main" val="1045687176"/>
+                    <a16:rowId xmlns:a16="http://schemas.microsoft.com/office/drawing/2014/main" xmlns="" val="1045687176"/>
                   </a:ext>
                 </a:extLst>
               </a:tr>
@@ -11245,7 +11285,7 @@
                 </a:tc>
                 <a:extLst>
                   <a:ext uri="{0D108BD9-81ED-4DB2-BD59-A6C34878D82A}">
-                    <a16:rowId xmlns="" xmlns:a16="http://schemas.microsoft.com/office/drawing/2014/main" val="2351577163"/>
+                    <a16:rowId xmlns:a16="http://schemas.microsoft.com/office/drawing/2014/main" xmlns="" val="2351577163"/>
                   </a:ext>
                 </a:extLst>
               </a:tr>
@@ -11312,7 +11352,7 @@
                 </a:tc>
                 <a:extLst>
                   <a:ext uri="{0D108BD9-81ED-4DB2-BD59-A6C34878D82A}">
-                    <a16:rowId xmlns="" xmlns:a16="http://schemas.microsoft.com/office/drawing/2014/main" val="3050760200"/>
+                    <a16:rowId xmlns:a16="http://schemas.microsoft.com/office/drawing/2014/main" xmlns="" val="3050760200"/>
                   </a:ext>
                 </a:extLst>
               </a:tr>
@@ -11435,7 +11475,7 @@
   <p:timing>
     <p:tnLst>
       <p:par>
-        <p:cTn xmlns:p14="http://schemas.microsoft.com/office/powerpoint/2010/main" id="1" dur="indefinite" restart="never" nodeType="tmRoot"/>
+        <p:cTn id="1" dur="indefinite" restart="never" nodeType="tmRoot"/>
       </p:par>
     </p:tnLst>
   </p:timing>
@@ -11704,7 +11744,7 @@
   <a:extraClrSchemeLst/>
   <a:extLst>
     <a:ext uri="{05A4C25C-085E-4340-85A3-A5531E510DB2}">
-      <thm15:themeFamily xmlns="" xmlns:thm15="http://schemas.microsoft.com/office/thememl/2012/main" name="Company background presentation" id="{7C18907C-4901-42BD-8F2C-E63B32C9DCA3}" vid="{B4FC953D-0C69-4290-95E2-4EA0E2E67DEC}"/>
+      <thm15:themeFamily xmlns:thm15="http://schemas.microsoft.com/office/thememl/2012/main" name="Company background presentation" id="{7C18907C-4901-42BD-8F2C-E63B32C9DCA3}" vid="{B4FC953D-0C69-4290-95E2-4EA0E2E67DEC}"/>
     </a:ext>
   </a:extLst>
 </a:theme>
@@ -11965,7 +12005,7 @@
   <a:extraClrSchemeLst/>
   <a:extLst>
     <a:ext uri="{05A4C25C-085E-4340-85A3-A5531E510DB2}">
-      <thm15:themeFamily xmlns="" xmlns:thm15="http://schemas.microsoft.com/office/thememl/2012/main" name="Office Theme" id="{62F939B6-93AF-4DB8-9C6B-D6C7DFDC589F}" vid="{4A3C46E8-61CC-4603-A589-7422A47A8E4A}"/>
+      <thm15:themeFamily xmlns:thm15="http://schemas.microsoft.com/office/thememl/2012/main" name="Office Theme" id="{62F939B6-93AF-4DB8-9C6B-D6C7DFDC589F}" vid="{4A3C46E8-61CC-4603-A589-7422A47A8E4A}"/>
     </a:ext>
   </a:extLst>
 </a:theme>
@@ -12226,7 +12266,7 @@
   <a:extraClrSchemeLst/>
   <a:extLst>
     <a:ext uri="{05A4C25C-085E-4340-85A3-A5531E510DB2}">
-      <thm15:themeFamily xmlns="" xmlns:thm15="http://schemas.microsoft.com/office/thememl/2012/main" name="Office Theme" id="{62F939B6-93AF-4DB8-9C6B-D6C7DFDC589F}" vid="{4A3C46E8-61CC-4603-A589-7422A47A8E4A}"/>
+      <thm15:themeFamily xmlns:thm15="http://schemas.microsoft.com/office/thememl/2012/main" name="Office Theme" id="{62F939B6-93AF-4DB8-9C6B-D6C7DFDC589F}" vid="{4A3C46E8-61CC-4603-A589-7422A47A8E4A}"/>
     </a:ext>
   </a:extLst>
 </a:theme>

</xml_diff>